<commit_message>
Game Almost Fully Complete
</commit_message>
<xml_diff>
--- a/Programming Assesment.pptx
+++ b/Programming Assesment.pptx
@@ -14,15 +14,19 @@
     <p:sldId id="262" r:id="rId8"/>
     <p:sldId id="263" r:id="rId9"/>
     <p:sldId id="264" r:id="rId10"/>
-    <p:sldId id="265" r:id="rId11"/>
-    <p:sldId id="266" r:id="rId12"/>
-    <p:sldId id="268" r:id="rId13"/>
-    <p:sldId id="269" r:id="rId14"/>
-    <p:sldId id="270" r:id="rId15"/>
-    <p:sldId id="271" r:id="rId16"/>
-    <p:sldId id="272" r:id="rId17"/>
-    <p:sldId id="273" r:id="rId18"/>
-    <p:sldId id="274" r:id="rId19"/>
+    <p:sldId id="276" r:id="rId11"/>
+    <p:sldId id="265" r:id="rId12"/>
+    <p:sldId id="266" r:id="rId13"/>
+    <p:sldId id="268" r:id="rId14"/>
+    <p:sldId id="269" r:id="rId15"/>
+    <p:sldId id="270" r:id="rId16"/>
+    <p:sldId id="271" r:id="rId17"/>
+    <p:sldId id="277" r:id="rId18"/>
+    <p:sldId id="272" r:id="rId19"/>
+    <p:sldId id="275" r:id="rId20"/>
+    <p:sldId id="278" r:id="rId21"/>
+    <p:sldId id="273" r:id="rId22"/>
+    <p:sldId id="274" r:id="rId23"/>
   </p:sldIdLst>
   <p:sldSz cx="12192000" cy="6858000"/>
   <p:notesSz cx="6858000" cy="9144000"/>
@@ -140,6 +144,7 @@
     <p1510:client id="{2E13400A-93CE-23A9-CF97-FEFD0D57F2B7}" v="207" dt="2021-06-17T22:44:31.234"/>
     <p1510:client id="{3312139C-ECA4-D6E5-6EA0-9FAF5992739F}" v="61" dt="2021-06-15T02:10:40.639"/>
     <p1510:client id="{33F175D3-4D32-71D5-6709-62DB828ADCB0}" v="83" dt="2021-06-03T22:45:46.848"/>
+    <p1510:client id="{49827196-21C6-0A67-9751-F39B4B6EF412}" v="910" dt="2021-08-05T00:27:52.848"/>
     <p1510:client id="{61852D5F-CC47-4EF3-8523-0D8470090199}" v="32" dt="2021-05-27T22:48:17.050"/>
     <p1510:client id="{82670D97-0EF6-5614-F833-FE3B0A574D76}" v="27" dt="2021-05-30T21:53:29.949"/>
     <p1510:client id="{83C94324-EBE6-7120-C8CE-3FACB84F21A0}" v="166" dt="2021-07-27T03:07:43.190"/>
@@ -1526,6 +1531,438 @@
             <pc:docMk/>
             <pc:sldMk cId="1564752394" sldId="261"/>
             <ac:picMk id="4" creationId="{95A9B02B-2840-47F5-851E-CE4DC41FA2E8}"/>
+          </ac:picMkLst>
+        </pc:picChg>
+      </pc:sldChg>
+    </pc:docChg>
+  </pc:docChgLst>
+  <pc:docChgLst>
+    <pc:chgData name="Jonny Morris" userId="S::morrisj70800@masseyhigh.school.nz::4fab9e21-29a7-4d03-b4c0-6c8a112c783d" providerId="AD" clId="Web-{49827196-21C6-0A67-9751-F39B4B6EF412}"/>
+    <pc:docChg chg="addSld modSld sldOrd">
+      <pc:chgData name="Jonny Morris" userId="S::morrisj70800@masseyhigh.school.nz::4fab9e21-29a7-4d03-b4c0-6c8a112c783d" providerId="AD" clId="Web-{49827196-21C6-0A67-9751-F39B4B6EF412}" dt="2021-08-05T00:27:52.848" v="492" actId="20577"/>
+      <pc:docMkLst>
+        <pc:docMk/>
+      </pc:docMkLst>
+      <pc:sldChg chg="modSp">
+        <pc:chgData name="Jonny Morris" userId="S::morrisj70800@masseyhigh.school.nz::4fab9e21-29a7-4d03-b4c0-6c8a112c783d" providerId="AD" clId="Web-{49827196-21C6-0A67-9751-F39B4B6EF412}" dt="2021-08-04T23:38:07.572" v="16" actId="20577"/>
+        <pc:sldMkLst>
+          <pc:docMk/>
+          <pc:sldMk cId="109857222" sldId="256"/>
+        </pc:sldMkLst>
+        <pc:spChg chg="mod">
+          <ac:chgData name="Jonny Morris" userId="S::morrisj70800@masseyhigh.school.nz::4fab9e21-29a7-4d03-b4c0-6c8a112c783d" providerId="AD" clId="Web-{49827196-21C6-0A67-9751-F39B4B6EF412}" dt="2021-08-04T23:38:07.572" v="16" actId="20577"/>
+          <ac:spMkLst>
+            <pc:docMk/>
+            <pc:sldMk cId="109857222" sldId="256"/>
+            <ac:spMk id="3" creationId="{00000000-0000-0000-0000-000000000000}"/>
+          </ac:spMkLst>
+        </pc:spChg>
+      </pc:sldChg>
+      <pc:sldChg chg="addSp delSp">
+        <pc:chgData name="Jonny Morris" userId="S::morrisj70800@masseyhigh.school.nz::4fab9e21-29a7-4d03-b4c0-6c8a112c783d" providerId="AD" clId="Web-{49827196-21C6-0A67-9751-F39B4B6EF412}" dt="2021-08-04T23:44:43.502" v="63"/>
+        <pc:sldMkLst>
+          <pc:docMk/>
+          <pc:sldMk cId="1522414602" sldId="264"/>
+        </pc:sldMkLst>
+        <pc:spChg chg="add del">
+          <ac:chgData name="Jonny Morris" userId="S::morrisj70800@masseyhigh.school.nz::4fab9e21-29a7-4d03-b4c0-6c8a112c783d" providerId="AD" clId="Web-{49827196-21C6-0A67-9751-F39B4B6EF412}" dt="2021-08-04T23:44:43.502" v="63"/>
+          <ac:spMkLst>
+            <pc:docMk/>
+            <pc:sldMk cId="1522414602" sldId="264"/>
+            <ac:spMk id="3" creationId="{1D1B0197-77EF-4543-8D84-AEDEB334764C}"/>
+          </ac:spMkLst>
+        </pc:spChg>
+      </pc:sldChg>
+      <pc:sldChg chg="addSp modSp mod setBg">
+        <pc:chgData name="Jonny Morris" userId="S::morrisj70800@masseyhigh.school.nz::4fab9e21-29a7-4d03-b4c0-6c8a112c783d" providerId="AD" clId="Web-{49827196-21C6-0A67-9751-F39B4B6EF412}" dt="2021-08-04T23:54:01.403" v="252"/>
+        <pc:sldMkLst>
+          <pc:docMk/>
+          <pc:sldMk cId="3945650720" sldId="270"/>
+        </pc:sldMkLst>
+        <pc:spChg chg="mod">
+          <ac:chgData name="Jonny Morris" userId="S::morrisj70800@masseyhigh.school.nz::4fab9e21-29a7-4d03-b4c0-6c8a112c783d" providerId="AD" clId="Web-{49827196-21C6-0A67-9751-F39B4B6EF412}" dt="2021-08-04T23:54:01.403" v="252"/>
+          <ac:spMkLst>
+            <pc:docMk/>
+            <pc:sldMk cId="3945650720" sldId="270"/>
+            <ac:spMk id="2" creationId="{60E7DE14-70EA-44B3-9974-68425BE0CF5E}"/>
+          </ac:spMkLst>
+        </pc:spChg>
+        <pc:spChg chg="mod">
+          <ac:chgData name="Jonny Morris" userId="S::morrisj70800@masseyhigh.school.nz::4fab9e21-29a7-4d03-b4c0-6c8a112c783d" providerId="AD" clId="Web-{49827196-21C6-0A67-9751-F39B4B6EF412}" dt="2021-08-04T23:54:01.403" v="252"/>
+          <ac:spMkLst>
+            <pc:docMk/>
+            <pc:sldMk cId="3945650720" sldId="270"/>
+            <ac:spMk id="5" creationId="{8FDA18EA-F9E6-4125-AEBA-086FCF91B257}"/>
+          </ac:spMkLst>
+        </pc:spChg>
+        <pc:spChg chg="add">
+          <ac:chgData name="Jonny Morris" userId="S::morrisj70800@masseyhigh.school.nz::4fab9e21-29a7-4d03-b4c0-6c8a112c783d" providerId="AD" clId="Web-{49827196-21C6-0A67-9751-F39B4B6EF412}" dt="2021-08-04T23:54:01.403" v="252"/>
+          <ac:spMkLst>
+            <pc:docMk/>
+            <pc:sldMk cId="3945650720" sldId="270"/>
+            <ac:spMk id="10" creationId="{FF9B822F-893E-44C8-963C-64F50ACECBB2}"/>
+          </ac:spMkLst>
+        </pc:spChg>
+        <pc:spChg chg="add">
+          <ac:chgData name="Jonny Morris" userId="S::morrisj70800@masseyhigh.school.nz::4fab9e21-29a7-4d03-b4c0-6c8a112c783d" providerId="AD" clId="Web-{49827196-21C6-0A67-9751-F39B4B6EF412}" dt="2021-08-04T23:54:01.403" v="252"/>
+          <ac:spMkLst>
+            <pc:docMk/>
+            <pc:sldMk cId="3945650720" sldId="270"/>
+            <ac:spMk id="12" creationId="{EBF87945-A001-489F-9D9B-7D9435F0B9CA}"/>
+          </ac:spMkLst>
+        </pc:spChg>
+        <pc:picChg chg="mod">
+          <ac:chgData name="Jonny Morris" userId="S::morrisj70800@masseyhigh.school.nz::4fab9e21-29a7-4d03-b4c0-6c8a112c783d" providerId="AD" clId="Web-{49827196-21C6-0A67-9751-F39B4B6EF412}" dt="2021-08-04T23:54:01.403" v="252"/>
+          <ac:picMkLst>
+            <pc:docMk/>
+            <pc:sldMk cId="3945650720" sldId="270"/>
+            <ac:picMk id="4" creationId="{A1706CB7-CC2F-4A7B-8BD0-E211B93323FD}"/>
+          </ac:picMkLst>
+        </pc:picChg>
+      </pc:sldChg>
+      <pc:sldChg chg="addSp modSp mod setBg addAnim">
+        <pc:chgData name="Jonny Morris" userId="S::morrisj70800@masseyhigh.school.nz::4fab9e21-29a7-4d03-b4c0-6c8a112c783d" providerId="AD" clId="Web-{49827196-21C6-0A67-9751-F39B4B6EF412}" dt="2021-08-04T23:54:05.200" v="254"/>
+        <pc:sldMkLst>
+          <pc:docMk/>
+          <pc:sldMk cId="2979753223" sldId="271"/>
+        </pc:sldMkLst>
+        <pc:spChg chg="mod">
+          <ac:chgData name="Jonny Morris" userId="S::morrisj70800@masseyhigh.school.nz::4fab9e21-29a7-4d03-b4c0-6c8a112c783d" providerId="AD" clId="Web-{49827196-21C6-0A67-9751-F39B4B6EF412}" dt="2021-08-04T23:54:05.200" v="253"/>
+          <ac:spMkLst>
+            <pc:docMk/>
+            <pc:sldMk cId="2979753223" sldId="271"/>
+            <ac:spMk id="2" creationId="{B6F9831D-160A-4D36-8279-AA7751BCE2BE}"/>
+          </ac:spMkLst>
+        </pc:spChg>
+        <pc:spChg chg="mod">
+          <ac:chgData name="Jonny Morris" userId="S::morrisj70800@masseyhigh.school.nz::4fab9e21-29a7-4d03-b4c0-6c8a112c783d" providerId="AD" clId="Web-{49827196-21C6-0A67-9751-F39B4B6EF412}" dt="2021-08-04T23:54:05.200" v="253"/>
+          <ac:spMkLst>
+            <pc:docMk/>
+            <pc:sldMk cId="2979753223" sldId="271"/>
+            <ac:spMk id="5" creationId="{051F399E-7412-45E8-93C4-314BD2B3DFBF}"/>
+          </ac:spMkLst>
+        </pc:spChg>
+        <pc:spChg chg="add">
+          <ac:chgData name="Jonny Morris" userId="S::morrisj70800@masseyhigh.school.nz::4fab9e21-29a7-4d03-b4c0-6c8a112c783d" providerId="AD" clId="Web-{49827196-21C6-0A67-9751-F39B4B6EF412}" dt="2021-08-04T23:54:05.200" v="253"/>
+          <ac:spMkLst>
+            <pc:docMk/>
+            <pc:sldMk cId="2979753223" sldId="271"/>
+            <ac:spMk id="10" creationId="{FF9B822F-893E-44C8-963C-64F50ACECBB2}"/>
+          </ac:spMkLst>
+        </pc:spChg>
+        <pc:spChg chg="add">
+          <ac:chgData name="Jonny Morris" userId="S::morrisj70800@masseyhigh.school.nz::4fab9e21-29a7-4d03-b4c0-6c8a112c783d" providerId="AD" clId="Web-{49827196-21C6-0A67-9751-F39B4B6EF412}" dt="2021-08-04T23:54:05.200" v="253"/>
+          <ac:spMkLst>
+            <pc:docMk/>
+            <pc:sldMk cId="2979753223" sldId="271"/>
+            <ac:spMk id="12" creationId="{EBF87945-A001-489F-9D9B-7D9435F0B9CA}"/>
+          </ac:spMkLst>
+        </pc:spChg>
+        <pc:picChg chg="mod">
+          <ac:chgData name="Jonny Morris" userId="S::morrisj70800@masseyhigh.school.nz::4fab9e21-29a7-4d03-b4c0-6c8a112c783d" providerId="AD" clId="Web-{49827196-21C6-0A67-9751-F39B4B6EF412}" dt="2021-08-04T23:54:05.200" v="253"/>
+          <ac:picMkLst>
+            <pc:docMk/>
+            <pc:sldMk cId="2979753223" sldId="271"/>
+            <ac:picMk id="4" creationId="{1729CBEA-C57C-4513-830F-C965F939AA8F}"/>
+          </ac:picMkLst>
+        </pc:picChg>
+      </pc:sldChg>
+      <pc:sldChg chg="addSp modSp mod setBg">
+        <pc:chgData name="Jonny Morris" userId="S::morrisj70800@masseyhigh.school.nz::4fab9e21-29a7-4d03-b4c0-6c8a112c783d" providerId="AD" clId="Web-{49827196-21C6-0A67-9751-F39B4B6EF412}" dt="2021-08-04T23:54:13.059" v="256"/>
+        <pc:sldMkLst>
+          <pc:docMk/>
+          <pc:sldMk cId="1147695793" sldId="272"/>
+        </pc:sldMkLst>
+        <pc:spChg chg="mod">
+          <ac:chgData name="Jonny Morris" userId="S::morrisj70800@masseyhigh.school.nz::4fab9e21-29a7-4d03-b4c0-6c8a112c783d" providerId="AD" clId="Web-{49827196-21C6-0A67-9751-F39B4B6EF412}" dt="2021-08-04T23:54:13.059" v="256"/>
+          <ac:spMkLst>
+            <pc:docMk/>
+            <pc:sldMk cId="1147695793" sldId="272"/>
+            <ac:spMk id="2" creationId="{8F9B19EB-AE66-4095-9B45-4E189A272D7C}"/>
+          </ac:spMkLst>
+        </pc:spChg>
+        <pc:spChg chg="mod">
+          <ac:chgData name="Jonny Morris" userId="S::morrisj70800@masseyhigh.school.nz::4fab9e21-29a7-4d03-b4c0-6c8a112c783d" providerId="AD" clId="Web-{49827196-21C6-0A67-9751-F39B4B6EF412}" dt="2021-08-04T23:54:13.059" v="256"/>
+          <ac:spMkLst>
+            <pc:docMk/>
+            <pc:sldMk cId="1147695793" sldId="272"/>
+            <ac:spMk id="5" creationId="{2451DC0A-CE8C-4807-BE9D-490B61D1DB52}"/>
+          </ac:spMkLst>
+        </pc:spChg>
+        <pc:spChg chg="add">
+          <ac:chgData name="Jonny Morris" userId="S::morrisj70800@masseyhigh.school.nz::4fab9e21-29a7-4d03-b4c0-6c8a112c783d" providerId="AD" clId="Web-{49827196-21C6-0A67-9751-F39B4B6EF412}" dt="2021-08-04T23:54:13.059" v="256"/>
+          <ac:spMkLst>
+            <pc:docMk/>
+            <pc:sldMk cId="1147695793" sldId="272"/>
+            <ac:spMk id="10" creationId="{FF9B822F-893E-44C8-963C-64F50ACECBB2}"/>
+          </ac:spMkLst>
+        </pc:spChg>
+        <pc:spChg chg="add">
+          <ac:chgData name="Jonny Morris" userId="S::morrisj70800@masseyhigh.school.nz::4fab9e21-29a7-4d03-b4c0-6c8a112c783d" providerId="AD" clId="Web-{49827196-21C6-0A67-9751-F39B4B6EF412}" dt="2021-08-04T23:54:13.059" v="256"/>
+          <ac:spMkLst>
+            <pc:docMk/>
+            <pc:sldMk cId="1147695793" sldId="272"/>
+            <ac:spMk id="12" creationId="{EBF87945-A001-489F-9D9B-7D9435F0B9CA}"/>
+          </ac:spMkLst>
+        </pc:spChg>
+        <pc:picChg chg="mod">
+          <ac:chgData name="Jonny Morris" userId="S::morrisj70800@masseyhigh.school.nz::4fab9e21-29a7-4d03-b4c0-6c8a112c783d" providerId="AD" clId="Web-{49827196-21C6-0A67-9751-F39B4B6EF412}" dt="2021-08-04T23:54:13.059" v="256"/>
+          <ac:picMkLst>
+            <pc:docMk/>
+            <pc:sldMk cId="1147695793" sldId="272"/>
+            <ac:picMk id="4" creationId="{8438ADBC-F5AF-4A8A-85E8-EE67AC40482F}"/>
+          </ac:picMkLst>
+        </pc:picChg>
+      </pc:sldChg>
+      <pc:sldChg chg="addSp delSp modSp new mod ord setBg setClrOvrMap">
+        <pc:chgData name="Jonny Morris" userId="S::morrisj70800@masseyhigh.school.nz::4fab9e21-29a7-4d03-b4c0-6c8a112c783d" providerId="AD" clId="Web-{49827196-21C6-0A67-9751-F39B4B6EF412}" dt="2021-08-04T23:54:19.966" v="259"/>
+        <pc:sldMkLst>
+          <pc:docMk/>
+          <pc:sldMk cId="4073712171" sldId="275"/>
+        </pc:sldMkLst>
+        <pc:spChg chg="mod">
+          <ac:chgData name="Jonny Morris" userId="S::morrisj70800@masseyhigh.school.nz::4fab9e21-29a7-4d03-b4c0-6c8a112c783d" providerId="AD" clId="Web-{49827196-21C6-0A67-9751-F39B4B6EF412}" dt="2021-08-04T23:54:19.966" v="259"/>
+          <ac:spMkLst>
+            <pc:docMk/>
+            <pc:sldMk cId="4073712171" sldId="275"/>
+            <ac:spMk id="2" creationId="{3338A35F-DABA-455B-8609-6074B938D782}"/>
+          </ac:spMkLst>
+        </pc:spChg>
+        <pc:spChg chg="del">
+          <ac:chgData name="Jonny Morris" userId="S::morrisj70800@masseyhigh.school.nz::4fab9e21-29a7-4d03-b4c0-6c8a112c783d" providerId="AD" clId="Web-{49827196-21C6-0A67-9751-F39B4B6EF412}" dt="2021-08-04T23:41:19.170" v="23"/>
+          <ac:spMkLst>
+            <pc:docMk/>
+            <pc:sldMk cId="4073712171" sldId="275"/>
+            <ac:spMk id="3" creationId="{84F87CD9-B59B-469E-A943-48812D4F2089}"/>
+          </ac:spMkLst>
+        </pc:spChg>
+        <pc:spChg chg="add mod">
+          <ac:chgData name="Jonny Morris" userId="S::morrisj70800@masseyhigh.school.nz::4fab9e21-29a7-4d03-b4c0-6c8a112c783d" providerId="AD" clId="Web-{49827196-21C6-0A67-9751-F39B4B6EF412}" dt="2021-08-04T23:54:19.966" v="259"/>
+          <ac:spMkLst>
+            <pc:docMk/>
+            <pc:sldMk cId="4073712171" sldId="275"/>
+            <ac:spMk id="5" creationId="{CBF23F37-2278-4E92-B09D-D23C6A43DF06}"/>
+          </ac:spMkLst>
+        </pc:spChg>
+        <pc:spChg chg="add">
+          <ac:chgData name="Jonny Morris" userId="S::morrisj70800@masseyhigh.school.nz::4fab9e21-29a7-4d03-b4c0-6c8a112c783d" providerId="AD" clId="Web-{49827196-21C6-0A67-9751-F39B4B6EF412}" dt="2021-08-04T23:54:19.966" v="259"/>
+          <ac:spMkLst>
+            <pc:docMk/>
+            <pc:sldMk cId="4073712171" sldId="275"/>
+            <ac:spMk id="7" creationId="{F2B38F72-8FC4-4001-8C67-FA6B86DEC767}"/>
+          </ac:spMkLst>
+        </pc:spChg>
+        <pc:spChg chg="add del">
+          <ac:chgData name="Jonny Morris" userId="S::morrisj70800@masseyhigh.school.nz::4fab9e21-29a7-4d03-b4c0-6c8a112c783d" providerId="AD" clId="Web-{49827196-21C6-0A67-9751-F39B4B6EF412}" dt="2021-08-04T23:54:19.966" v="258"/>
+          <ac:spMkLst>
+            <pc:docMk/>
+            <pc:sldMk cId="4073712171" sldId="275"/>
+            <ac:spMk id="10" creationId="{FF9B822F-893E-44C8-963C-64F50ACECBB2}"/>
+          </ac:spMkLst>
+        </pc:spChg>
+        <pc:spChg chg="add del">
+          <ac:chgData name="Jonny Morris" userId="S::morrisj70800@masseyhigh.school.nz::4fab9e21-29a7-4d03-b4c0-6c8a112c783d" providerId="AD" clId="Web-{49827196-21C6-0A67-9751-F39B4B6EF412}" dt="2021-08-04T23:54:19.966" v="258"/>
+          <ac:spMkLst>
+            <pc:docMk/>
+            <pc:sldMk cId="4073712171" sldId="275"/>
+            <ac:spMk id="12" creationId="{EBF87945-A001-489F-9D9B-7D9435F0B9CA}"/>
+          </ac:spMkLst>
+        </pc:spChg>
+        <pc:picChg chg="add mod ord">
+          <ac:chgData name="Jonny Morris" userId="S::morrisj70800@masseyhigh.school.nz::4fab9e21-29a7-4d03-b4c0-6c8a112c783d" providerId="AD" clId="Web-{49827196-21C6-0A67-9751-F39B4B6EF412}" dt="2021-08-04T23:54:19.966" v="259"/>
+          <ac:picMkLst>
+            <pc:docMk/>
+            <pc:sldMk cId="4073712171" sldId="275"/>
+            <ac:picMk id="4" creationId="{E47BF48B-7588-4313-AA40-790DCA6BB714}"/>
+          </ac:picMkLst>
+        </pc:picChg>
+      </pc:sldChg>
+      <pc:sldChg chg="modSp new">
+        <pc:chgData name="Jonny Morris" userId="S::morrisj70800@masseyhigh.school.nz::4fab9e21-29a7-4d03-b4c0-6c8a112c783d" providerId="AD" clId="Web-{49827196-21C6-0A67-9751-F39B4B6EF412}" dt="2021-08-04T23:47:39.380" v="122" actId="20577"/>
+        <pc:sldMkLst>
+          <pc:docMk/>
+          <pc:sldMk cId="2978787033" sldId="276"/>
+        </pc:sldMkLst>
+        <pc:spChg chg="mod">
+          <ac:chgData name="Jonny Morris" userId="S::morrisj70800@masseyhigh.school.nz::4fab9e21-29a7-4d03-b4c0-6c8a112c783d" providerId="AD" clId="Web-{49827196-21C6-0A67-9751-F39B4B6EF412}" dt="2021-08-04T23:45:28.331" v="72" actId="20577"/>
+          <ac:spMkLst>
+            <pc:docMk/>
+            <pc:sldMk cId="2978787033" sldId="276"/>
+            <ac:spMk id="2" creationId="{CD6BF71A-171F-4E6E-A394-A1CFC42C4768}"/>
+          </ac:spMkLst>
+        </pc:spChg>
+        <pc:spChg chg="mod">
+          <ac:chgData name="Jonny Morris" userId="S::morrisj70800@masseyhigh.school.nz::4fab9e21-29a7-4d03-b4c0-6c8a112c783d" providerId="AD" clId="Web-{49827196-21C6-0A67-9751-F39B4B6EF412}" dt="2021-08-04T23:47:39.380" v="122" actId="20577"/>
+          <ac:spMkLst>
+            <pc:docMk/>
+            <pc:sldMk cId="2978787033" sldId="276"/>
+            <ac:spMk id="3" creationId="{E51BD6D8-6E8E-4D51-B2DF-71FD7FCC74C9}"/>
+          </ac:spMkLst>
+        </pc:spChg>
+      </pc:sldChg>
+      <pc:sldChg chg="addSp delSp modSp new mod setBg">
+        <pc:chgData name="Jonny Morris" userId="S::morrisj70800@masseyhigh.school.nz::4fab9e21-29a7-4d03-b4c0-6c8a112c783d" providerId="AD" clId="Web-{49827196-21C6-0A67-9751-F39B4B6EF412}" dt="2021-08-05T00:27:52.848" v="492" actId="20577"/>
+        <pc:sldMkLst>
+          <pc:docMk/>
+          <pc:sldMk cId="794014388" sldId="277"/>
+        </pc:sldMkLst>
+        <pc:spChg chg="mod">
+          <ac:chgData name="Jonny Morris" userId="S::morrisj70800@masseyhigh.school.nz::4fab9e21-29a7-4d03-b4c0-6c8a112c783d" providerId="AD" clId="Web-{49827196-21C6-0A67-9751-F39B4B6EF412}" dt="2021-08-04T23:54:08.637" v="255"/>
+          <ac:spMkLst>
+            <pc:docMk/>
+            <pc:sldMk cId="794014388" sldId="277"/>
+            <ac:spMk id="2" creationId="{82FB8FBF-1031-46B5-A87C-F43678C019B8}"/>
+          </ac:spMkLst>
+        </pc:spChg>
+        <pc:spChg chg="del">
+          <ac:chgData name="Jonny Morris" userId="S::morrisj70800@masseyhigh.school.nz::4fab9e21-29a7-4d03-b4c0-6c8a112c783d" providerId="AD" clId="Web-{49827196-21C6-0A67-9751-F39B4B6EF412}" dt="2021-08-04T23:48:24.803" v="128"/>
+          <ac:spMkLst>
+            <pc:docMk/>
+            <pc:sldMk cId="794014388" sldId="277"/>
+            <ac:spMk id="3" creationId="{9015748C-E572-4FE6-B78F-902598971B39}"/>
+          </ac:spMkLst>
+        </pc:spChg>
+        <pc:spChg chg="add mod">
+          <ac:chgData name="Jonny Morris" userId="S::morrisj70800@masseyhigh.school.nz::4fab9e21-29a7-4d03-b4c0-6c8a112c783d" providerId="AD" clId="Web-{49827196-21C6-0A67-9751-F39B4B6EF412}" dt="2021-08-05T00:26:39.300" v="457" actId="1076"/>
+          <ac:spMkLst>
+            <pc:docMk/>
+            <pc:sldMk cId="794014388" sldId="277"/>
+            <ac:spMk id="5" creationId="{6BD91205-CFFE-4DB2-B4FA-3B66A4D4EB17}"/>
+          </ac:spMkLst>
+        </pc:spChg>
+        <pc:spChg chg="add del mod">
+          <ac:chgData name="Jonny Morris" userId="S::morrisj70800@masseyhigh.school.nz::4fab9e21-29a7-4d03-b4c0-6c8a112c783d" providerId="AD" clId="Web-{49827196-21C6-0A67-9751-F39B4B6EF412}" dt="2021-08-05T00:06:27.683" v="400"/>
+          <ac:spMkLst>
+            <pc:docMk/>
+            <pc:sldMk cId="794014388" sldId="277"/>
+            <ac:spMk id="7" creationId="{29572142-1AC4-4E18-A83A-CD45370C3146}"/>
+          </ac:spMkLst>
+        </pc:spChg>
+        <pc:spChg chg="add">
+          <ac:chgData name="Jonny Morris" userId="S::morrisj70800@masseyhigh.school.nz::4fab9e21-29a7-4d03-b4c0-6c8a112c783d" providerId="AD" clId="Web-{49827196-21C6-0A67-9751-F39B4B6EF412}" dt="2021-08-04T23:54:08.637" v="255"/>
+          <ac:spMkLst>
+            <pc:docMk/>
+            <pc:sldMk cId="794014388" sldId="277"/>
+            <ac:spMk id="10" creationId="{FF9B822F-893E-44C8-963C-64F50ACECBB2}"/>
+          </ac:spMkLst>
+        </pc:spChg>
+        <pc:spChg chg="add del">
+          <ac:chgData name="Jonny Morris" userId="S::morrisj70800@masseyhigh.school.nz::4fab9e21-29a7-4d03-b4c0-6c8a112c783d" providerId="AD" clId="Web-{49827196-21C6-0A67-9751-F39B4B6EF412}" dt="2021-08-05T00:26:36.331" v="456"/>
+          <ac:spMkLst>
+            <pc:docMk/>
+            <pc:sldMk cId="794014388" sldId="277"/>
+            <ac:spMk id="11" creationId="{6F81A4CD-04B0-43A5-A754-1779698E46E3}"/>
+          </ac:spMkLst>
+        </pc:spChg>
+        <pc:spChg chg="add">
+          <ac:chgData name="Jonny Morris" userId="S::morrisj70800@masseyhigh.school.nz::4fab9e21-29a7-4d03-b4c0-6c8a112c783d" providerId="AD" clId="Web-{49827196-21C6-0A67-9751-F39B4B6EF412}" dt="2021-08-04T23:54:08.637" v="255"/>
+          <ac:spMkLst>
+            <pc:docMk/>
+            <pc:sldMk cId="794014388" sldId="277"/>
+            <ac:spMk id="12" creationId="{EBF87945-A001-489F-9D9B-7D9435F0B9CA}"/>
+          </ac:spMkLst>
+        </pc:spChg>
+        <pc:spChg chg="add mod">
+          <ac:chgData name="Jonny Morris" userId="S::morrisj70800@masseyhigh.school.nz::4fab9e21-29a7-4d03-b4c0-6c8a112c783d" providerId="AD" clId="Web-{49827196-21C6-0A67-9751-F39B4B6EF412}" dt="2021-08-05T00:27:52.848" v="492" actId="20577"/>
+          <ac:spMkLst>
+            <pc:docMk/>
+            <pc:sldMk cId="794014388" sldId="277"/>
+            <ac:spMk id="13" creationId="{F13D55FB-4924-4928-8E29-4D38F59B4ECB}"/>
+          </ac:spMkLst>
+        </pc:spChg>
+        <pc:picChg chg="add del mod ord">
+          <ac:chgData name="Jonny Morris" userId="S::morrisj70800@masseyhigh.school.nz::4fab9e21-29a7-4d03-b4c0-6c8a112c783d" providerId="AD" clId="Web-{49827196-21C6-0A67-9751-F39B4B6EF412}" dt="2021-08-05T00:06:10.651" v="398"/>
+          <ac:picMkLst>
+            <pc:docMk/>
+            <pc:sldMk cId="794014388" sldId="277"/>
+            <ac:picMk id="4" creationId="{1DC74A34-08A5-4B79-AD70-B1A4EF3D6447}"/>
+          </ac:picMkLst>
+        </pc:picChg>
+        <pc:picChg chg="add mod ord">
+          <ac:chgData name="Jonny Morris" userId="S::morrisj70800@masseyhigh.school.nz::4fab9e21-29a7-4d03-b4c0-6c8a112c783d" providerId="AD" clId="Web-{49827196-21C6-0A67-9751-F39B4B6EF412}" dt="2021-08-05T00:26:05.346" v="447" actId="1076"/>
+          <ac:picMkLst>
+            <pc:docMk/>
+            <pc:sldMk cId="794014388" sldId="277"/>
+            <ac:picMk id="8" creationId="{D7FC79EA-84EE-4982-9317-98CCF21BC847}"/>
+          </ac:picMkLst>
+        </pc:picChg>
+        <pc:picChg chg="add mod">
+          <ac:chgData name="Jonny Morris" userId="S::morrisj70800@masseyhigh.school.nz::4fab9e21-29a7-4d03-b4c0-6c8a112c783d" providerId="AD" clId="Web-{49827196-21C6-0A67-9751-F39B4B6EF412}" dt="2021-08-05T00:26:34.550" v="455" actId="1076"/>
+          <ac:picMkLst>
+            <pc:docMk/>
+            <pc:sldMk cId="794014388" sldId="277"/>
+            <ac:picMk id="9" creationId="{750F2E14-5FA7-47BD-97CC-8BC03DBB67FA}"/>
+          </ac:picMkLst>
+        </pc:picChg>
+      </pc:sldChg>
+      <pc:sldChg chg="addSp delSp modSp new mod setBg setClrOvrMap">
+        <pc:chgData name="Jonny Morris" userId="S::morrisj70800@masseyhigh.school.nz::4fab9e21-29a7-4d03-b4c0-6c8a112c783d" providerId="AD" clId="Web-{49827196-21C6-0A67-9751-F39B4B6EF412}" dt="2021-08-05T00:18:17.806" v="445" actId="20577"/>
+        <pc:sldMkLst>
+          <pc:docMk/>
+          <pc:sldMk cId="446857315" sldId="278"/>
+        </pc:sldMkLst>
+        <pc:spChg chg="mod">
+          <ac:chgData name="Jonny Morris" userId="S::morrisj70800@masseyhigh.school.nz::4fab9e21-29a7-4d03-b4c0-6c8a112c783d" providerId="AD" clId="Web-{49827196-21C6-0A67-9751-F39B4B6EF412}" dt="2021-08-04T23:59:28.534" v="263"/>
+          <ac:spMkLst>
+            <pc:docMk/>
+            <pc:sldMk cId="446857315" sldId="278"/>
+            <ac:spMk id="2" creationId="{EBD7D066-8CE0-4FF3-8DC5-ECEB4DD8FB3E}"/>
+          </ac:spMkLst>
+        </pc:spChg>
+        <pc:spChg chg="del">
+          <ac:chgData name="Jonny Morris" userId="S::morrisj70800@masseyhigh.school.nz::4fab9e21-29a7-4d03-b4c0-6c8a112c783d" providerId="AD" clId="Web-{49827196-21C6-0A67-9751-F39B4B6EF412}" dt="2021-08-04T23:59:13.659" v="260"/>
+          <ac:spMkLst>
+            <pc:docMk/>
+            <pc:sldMk cId="446857315" sldId="278"/>
+            <ac:spMk id="3" creationId="{CF8036E7-5E6E-41FA-AF88-F4362D96C3E8}"/>
+          </ac:spMkLst>
+        </pc:spChg>
+        <pc:spChg chg="add mod">
+          <ac:chgData name="Jonny Morris" userId="S::morrisj70800@masseyhigh.school.nz::4fab9e21-29a7-4d03-b4c0-6c8a112c783d" providerId="AD" clId="Web-{49827196-21C6-0A67-9751-F39B4B6EF412}" dt="2021-08-05T00:17:46.680" v="431" actId="20577"/>
+          <ac:spMkLst>
+            <pc:docMk/>
+            <pc:sldMk cId="446857315" sldId="278"/>
+            <ac:spMk id="5" creationId="{FB094B74-0B5A-45CD-B694-352345F0BA54}"/>
+          </ac:spMkLst>
+        </pc:spChg>
+        <pc:spChg chg="add mod">
+          <ac:chgData name="Jonny Morris" userId="S::morrisj70800@masseyhigh.school.nz::4fab9e21-29a7-4d03-b4c0-6c8a112c783d" providerId="AD" clId="Web-{49827196-21C6-0A67-9751-F39B4B6EF412}" dt="2021-08-05T00:18:17.806" v="445" actId="20577"/>
+          <ac:spMkLst>
+            <pc:docMk/>
+            <pc:sldMk cId="446857315" sldId="278"/>
+            <ac:spMk id="7" creationId="{E503F48E-5D6B-4297-B4BA-E1202BFA09DD}"/>
+          </ac:spMkLst>
+        </pc:spChg>
+        <pc:spChg chg="add del">
+          <ac:chgData name="Jonny Morris" userId="S::morrisj70800@masseyhigh.school.nz::4fab9e21-29a7-4d03-b4c0-6c8a112c783d" providerId="AD" clId="Web-{49827196-21C6-0A67-9751-F39B4B6EF412}" dt="2021-08-04T23:59:28.534" v="263"/>
+          <ac:spMkLst>
+            <pc:docMk/>
+            <pc:sldMk cId="446857315" sldId="278"/>
+            <ac:spMk id="8" creationId="{1C8CEBBE-4037-4ADF-8051-0781B96BB7A1}"/>
+          </ac:spMkLst>
+        </pc:spChg>
+        <pc:spChg chg="add del">
+          <ac:chgData name="Jonny Morris" userId="S::morrisj70800@masseyhigh.school.nz::4fab9e21-29a7-4d03-b4c0-6c8a112c783d" providerId="AD" clId="Web-{49827196-21C6-0A67-9751-F39B4B6EF412}" dt="2021-08-04T23:59:28.534" v="263"/>
+          <ac:spMkLst>
+            <pc:docMk/>
+            <pc:sldMk cId="446857315" sldId="278"/>
+            <ac:spMk id="11" creationId="{F2B38F72-8FC4-4001-8C67-FA6B86DEC767}"/>
+          </ac:spMkLst>
+        </pc:spChg>
+        <pc:picChg chg="add mod ord">
+          <ac:chgData name="Jonny Morris" userId="S::morrisj70800@masseyhigh.school.nz::4fab9e21-29a7-4d03-b4c0-6c8a112c783d" providerId="AD" clId="Web-{49827196-21C6-0A67-9751-F39B4B6EF412}" dt="2021-08-05T00:17:17.867" v="405" actId="14100"/>
+          <ac:picMkLst>
+            <pc:docMk/>
+            <pc:sldMk cId="446857315" sldId="278"/>
+            <ac:picMk id="4" creationId="{4FB97E77-E247-4A24-B0FF-F97706586B45}"/>
+          </ac:picMkLst>
+        </pc:picChg>
+        <pc:picChg chg="add mod">
+          <ac:chgData name="Jonny Morris" userId="S::morrisj70800@masseyhigh.school.nz::4fab9e21-29a7-4d03-b4c0-6c8a112c783d" providerId="AD" clId="Web-{49827196-21C6-0A67-9751-F39B4B6EF412}" dt="2021-08-05T00:17:23.774" v="408" actId="14100"/>
+          <ac:picMkLst>
+            <pc:docMk/>
+            <pc:sldMk cId="446857315" sldId="278"/>
+            <ac:picMk id="6" creationId="{05759C2A-6B97-41F9-8679-DBBB986216A1}"/>
           </ac:picMkLst>
         </pc:picChg>
       </pc:sldChg>
@@ -2004,7 +2441,7 @@
           <a:p>
             <a:fld id="{846CE7D5-CF57-46EF-B807-FDD0502418D4}" type="datetimeFigureOut">
               <a:rPr lang="en-US" smtClean="0"/>
-              <a:t>8/2/2021</a:t>
+              <a:t>8/4/2021</a:t>
             </a:fld>
             <a:endParaRPr lang="en-US"/>
           </a:p>
@@ -2172,7 +2609,7 @@
           <a:p>
             <a:fld id="{846CE7D5-CF57-46EF-B807-FDD0502418D4}" type="datetimeFigureOut">
               <a:rPr lang="en-US" smtClean="0"/>
-              <a:t>8/2/2021</a:t>
+              <a:t>8/4/2021</a:t>
             </a:fld>
             <a:endParaRPr lang="en-US"/>
           </a:p>
@@ -2350,7 +2787,7 @@
           <a:p>
             <a:fld id="{846CE7D5-CF57-46EF-B807-FDD0502418D4}" type="datetimeFigureOut">
               <a:rPr lang="en-US" smtClean="0"/>
-              <a:t>8/2/2021</a:t>
+              <a:t>8/4/2021</a:t>
             </a:fld>
             <a:endParaRPr lang="en-US"/>
           </a:p>
@@ -2518,7 +2955,7 @@
           <a:p>
             <a:fld id="{846CE7D5-CF57-46EF-B807-FDD0502418D4}" type="datetimeFigureOut">
               <a:rPr lang="en-US" smtClean="0"/>
-              <a:t>8/2/2021</a:t>
+              <a:t>8/4/2021</a:t>
             </a:fld>
             <a:endParaRPr lang="en-US"/>
           </a:p>
@@ -2763,7 +3200,7 @@
           <a:p>
             <a:fld id="{846CE7D5-CF57-46EF-B807-FDD0502418D4}" type="datetimeFigureOut">
               <a:rPr lang="en-US" smtClean="0"/>
-              <a:t>8/2/2021</a:t>
+              <a:t>8/4/2021</a:t>
             </a:fld>
             <a:endParaRPr lang="en-US"/>
           </a:p>
@@ -2992,7 +3429,7 @@
           <a:p>
             <a:fld id="{846CE7D5-CF57-46EF-B807-FDD0502418D4}" type="datetimeFigureOut">
               <a:rPr lang="en-US" smtClean="0"/>
-              <a:t>8/2/2021</a:t>
+              <a:t>8/4/2021</a:t>
             </a:fld>
             <a:endParaRPr lang="en-US"/>
           </a:p>
@@ -3356,7 +3793,7 @@
           <a:p>
             <a:fld id="{846CE7D5-CF57-46EF-B807-FDD0502418D4}" type="datetimeFigureOut">
               <a:rPr lang="en-US" smtClean="0"/>
-              <a:t>8/2/2021</a:t>
+              <a:t>8/4/2021</a:t>
             </a:fld>
             <a:endParaRPr lang="en-US"/>
           </a:p>
@@ -3473,7 +3910,7 @@
           <a:p>
             <a:fld id="{846CE7D5-CF57-46EF-B807-FDD0502418D4}" type="datetimeFigureOut">
               <a:rPr lang="en-US" smtClean="0"/>
-              <a:t>8/2/2021</a:t>
+              <a:t>8/4/2021</a:t>
             </a:fld>
             <a:endParaRPr lang="en-US"/>
           </a:p>
@@ -3568,7 +4005,7 @@
           <a:p>
             <a:fld id="{846CE7D5-CF57-46EF-B807-FDD0502418D4}" type="datetimeFigureOut">
               <a:rPr lang="en-US" smtClean="0"/>
-              <a:t>8/2/2021</a:t>
+              <a:t>8/4/2021</a:t>
             </a:fld>
             <a:endParaRPr lang="en-US"/>
           </a:p>
@@ -3843,7 +4280,7 @@
           <a:p>
             <a:fld id="{846CE7D5-CF57-46EF-B807-FDD0502418D4}" type="datetimeFigureOut">
               <a:rPr lang="en-US" smtClean="0"/>
-              <a:t>8/2/2021</a:t>
+              <a:t>8/4/2021</a:t>
             </a:fld>
             <a:endParaRPr lang="en-US"/>
           </a:p>
@@ -4098,7 +4535,7 @@
           <a:p>
             <a:fld id="{846CE7D5-CF57-46EF-B807-FDD0502418D4}" type="datetimeFigureOut">
               <a:rPr lang="en-US" smtClean="0"/>
-              <a:t>8/2/2021</a:t>
+              <a:t>8/4/2021</a:t>
             </a:fld>
             <a:endParaRPr lang="en-US"/>
           </a:p>
@@ -4309,7 +4746,7 @@
           <a:p>
             <a:fld id="{846CE7D5-CF57-46EF-B807-FDD0502418D4}" type="datetimeFigureOut">
               <a:rPr lang="en-US" smtClean="0"/>
-              <a:t>8/2/2021</a:t>
+              <a:t>8/4/2021</a:t>
             </a:fld>
             <a:endParaRPr lang="en-US"/>
           </a:p>
@@ -4756,10 +5193,31 @@
         </p:nvSpPr>
         <p:spPr/>
         <p:txBody>
-          <a:bodyPr/>
+          <a:bodyPr vert="horz" lIns="91440" tIns="45720" rIns="91440" bIns="45720" rtlCol="0" anchor="t">
+            <a:normAutofit/>
+          </a:bodyPr>
           <a:lstStyle/>
           <a:p>
-            <a:endParaRPr lang="en-US"/>
+            <a:r>
+              <a:rPr lang="en-US" dirty="0">
+                <a:cs typeface="Calibri"/>
+              </a:rPr>
+              <a:t>Project on </a:t>
+            </a:r>
+            <a:r>
+              <a:rPr lang="en-US" dirty="0" err="1">
+                <a:cs typeface="Calibri"/>
+              </a:rPr>
+              <a:t>Github</a:t>
+            </a:r>
+            <a:endParaRPr lang="en-US">
+              <a:cs typeface="Calibri"/>
+            </a:endParaRPr>
+          </a:p>
+          <a:p>
+            <a:endParaRPr lang="en-US" dirty="0">
+              <a:cs typeface="Calibri"/>
+            </a:endParaRPr>
           </a:p>
         </p:txBody>
       </p:sp>
@@ -4777,6 +5235,133 @@
 </file>
 
 <file path=ppt/slides/slide10.xml><?xml version="1.0" encoding="utf-8"?>
+<p:sld xmlns:a="http://schemas.openxmlformats.org/drawingml/2006/main" xmlns:r="http://schemas.openxmlformats.org/officeDocument/2006/relationships" xmlns:p="http://schemas.openxmlformats.org/presentationml/2006/main">
+  <p:cSld>
+    <p:spTree>
+      <p:nvGrpSpPr>
+        <p:cNvPr id="1" name=""/>
+        <p:cNvGrpSpPr/>
+        <p:nvPr/>
+      </p:nvGrpSpPr>
+      <p:grpSpPr>
+        <a:xfrm>
+          <a:off x="0" y="0"/>
+          <a:ext cx="0" cy="0"/>
+          <a:chOff x="0" y="0"/>
+          <a:chExt cx="0" cy="0"/>
+        </a:xfrm>
+      </p:grpSpPr>
+      <p:sp>
+        <p:nvSpPr>
+          <p:cNvPr id="2" name="Title 1">
+            <a:extLst>
+              <a:ext uri="{FF2B5EF4-FFF2-40B4-BE49-F238E27FC236}">
+                <a16:creationId xmlns:a16="http://schemas.microsoft.com/office/drawing/2014/main" id="{CD6BF71A-171F-4E6E-A394-A1CFC42C4768}"/>
+              </a:ext>
+            </a:extLst>
+          </p:cNvPr>
+          <p:cNvSpPr>
+            <a:spLocks noGrp="1"/>
+          </p:cNvSpPr>
+          <p:nvPr>
+            <p:ph type="title"/>
+          </p:nvPr>
+        </p:nvSpPr>
+        <p:spPr/>
+        <p:txBody>
+          <a:bodyPr/>
+          <a:lstStyle/>
+          <a:p>
+            <a:r>
+              <a:rPr lang="en-US" dirty="0">
+                <a:cs typeface="Calibri Light"/>
+              </a:rPr>
+              <a:t>Start GUI Test Plan</a:t>
+            </a:r>
+            <a:endParaRPr lang="en-US" dirty="0"/>
+          </a:p>
+        </p:txBody>
+      </p:sp>
+      <p:sp>
+        <p:nvSpPr>
+          <p:cNvPr id="3" name="Content Placeholder 2">
+            <a:extLst>
+              <a:ext uri="{FF2B5EF4-FFF2-40B4-BE49-F238E27FC236}">
+                <a16:creationId xmlns:a16="http://schemas.microsoft.com/office/drawing/2014/main" id="{E51BD6D8-6E8E-4D51-B2DF-71FD7FCC74C9}"/>
+              </a:ext>
+            </a:extLst>
+          </p:cNvPr>
+          <p:cNvSpPr>
+            <a:spLocks noGrp="1"/>
+          </p:cNvSpPr>
+          <p:nvPr>
+            <p:ph idx="1"/>
+          </p:nvPr>
+        </p:nvSpPr>
+        <p:spPr/>
+        <p:txBody>
+          <a:bodyPr vert="horz" lIns="91440" tIns="45720" rIns="91440" bIns="45720" rtlCol="0" anchor="t">
+            <a:normAutofit/>
+          </a:bodyPr>
+          <a:lstStyle/>
+          <a:p>
+            <a:r>
+              <a:rPr lang="en-US" dirty="0">
+                <a:cs typeface="Calibri"/>
+              </a:rPr>
+              <a:t>Press Play Button.                              </a:t>
+            </a:r>
+          </a:p>
+          <a:p>
+            <a:endParaRPr lang="en-US" dirty="0">
+              <a:cs typeface="Calibri"/>
+            </a:endParaRPr>
+          </a:p>
+          <a:p>
+            <a:r>
+              <a:rPr lang="en-US" dirty="0">
+                <a:cs typeface="Calibri"/>
+              </a:rPr>
+              <a:t>Press Exit Button in the Top right.</a:t>
+            </a:r>
+          </a:p>
+          <a:p>
+            <a:endParaRPr lang="en-US" dirty="0">
+              <a:cs typeface="Calibri"/>
+            </a:endParaRPr>
+          </a:p>
+          <a:p>
+            <a:r>
+              <a:rPr lang="en-US" dirty="0">
+                <a:cs typeface="Calibri"/>
+              </a:rPr>
+              <a:t>Play Button Works</a:t>
+            </a:r>
+          </a:p>
+          <a:p>
+            <a:r>
+              <a:rPr lang="en-US" dirty="0">
+                <a:cs typeface="Calibri"/>
+              </a:rPr>
+              <a:t>Exit Button also Works</a:t>
+            </a:r>
+          </a:p>
+        </p:txBody>
+      </p:sp>
+    </p:spTree>
+    <p:extLst>
+      <p:ext uri="{BB962C8B-B14F-4D97-AF65-F5344CB8AC3E}">
+        <p14:creationId xmlns:p14="http://schemas.microsoft.com/office/powerpoint/2010/main" val="2978787033"/>
+      </p:ext>
+    </p:extLst>
+  </p:cSld>
+  <p:clrMapOvr>
+    <a:masterClrMapping/>
+  </p:clrMapOvr>
+</p:sld>
+</file>
+
+<file path=ppt/slides/slide11.xml><?xml version="1.0" encoding="utf-8"?>
 <p:sld xmlns:a="http://schemas.openxmlformats.org/drawingml/2006/main" xmlns:r="http://schemas.openxmlformats.org/officeDocument/2006/relationships" xmlns:p="http://schemas.openxmlformats.org/presentationml/2006/main">
   <p:cSld>
     <p:bg>
@@ -5361,7 +5946,7 @@
 </p:sld>
 </file>
 
-<file path=ppt/slides/slide11.xml><?xml version="1.0" encoding="utf-8"?>
+<file path=ppt/slides/slide12.xml><?xml version="1.0" encoding="utf-8"?>
 <p:sld xmlns:a="http://schemas.openxmlformats.org/drawingml/2006/main" xmlns:r="http://schemas.openxmlformats.org/officeDocument/2006/relationships" xmlns:p="http://schemas.openxmlformats.org/presentationml/2006/main">
   <p:cSld>
     <p:bg>
@@ -5853,7 +6438,7 @@
 </p:sld>
 </file>
 
-<file path=ppt/slides/slide12.xml><?xml version="1.0" encoding="utf-8"?>
+<file path=ppt/slides/slide13.xml><?xml version="1.0" encoding="utf-8"?>
 <p:sld xmlns:a="http://schemas.openxmlformats.org/drawingml/2006/main" xmlns:r="http://schemas.openxmlformats.org/officeDocument/2006/relationships" xmlns:p="http://schemas.openxmlformats.org/presentationml/2006/main">
   <p:cSld>
     <p:bg>
@@ -6153,7 +6738,7 @@
 </p:sld>
 </file>
 
-<file path=ppt/slides/slide13.xml><?xml version="1.0" encoding="utf-8"?>
+<file path=ppt/slides/slide14.xml><?xml version="1.0" encoding="utf-8"?>
 <p:sld xmlns:a="http://schemas.openxmlformats.org/drawingml/2006/main" xmlns:r="http://schemas.openxmlformats.org/officeDocument/2006/relationships" xmlns:p="http://schemas.openxmlformats.org/presentationml/2006/main">
   <p:cSld>
     <p:bg>
@@ -6453,9 +7038,17 @@
 </p:sld>
 </file>
 
-<file path=ppt/slides/slide14.xml><?xml version="1.0" encoding="utf-8"?>
+<file path=ppt/slides/slide15.xml><?xml version="1.0" encoding="utf-8"?>
 <p:sld xmlns:a="http://schemas.openxmlformats.org/drawingml/2006/main" xmlns:r="http://schemas.openxmlformats.org/officeDocument/2006/relationships" xmlns:p="http://schemas.openxmlformats.org/presentationml/2006/main">
   <p:cSld>
+    <p:bg>
+      <p:bgPr>
+        <a:solidFill>
+          <a:schemeClr val="bg1"/>
+        </a:solidFill>
+        <a:effectLst/>
+      </p:bgPr>
+    </p:bg>
     <p:spTree>
       <p:nvGrpSpPr>
         <p:cNvPr id="1" name=""/>
@@ -6472,6 +7065,151 @@
       </p:grpSpPr>
       <p:sp>
         <p:nvSpPr>
+          <p:cNvPr id="10" name="Rectangle 9">
+            <a:extLst>
+              <a:ext uri="{FF2B5EF4-FFF2-40B4-BE49-F238E27FC236}">
+                <a16:creationId xmlns:a16="http://schemas.microsoft.com/office/drawing/2014/main" id="{FF9B822F-893E-44C8-963C-64F50ACECBB2}"/>
+              </a:ext>
+              <a:ext uri="{C183D7F6-B498-43B3-948B-1728B52AA6E4}">
+                <adec:decorative xmlns:adec="http://schemas.microsoft.com/office/drawing/2017/decorative" val="1"/>
+              </a:ext>
+            </a:extLst>
+          </p:cNvPr>
+          <p:cNvSpPr>
+            <a:spLocks noGrp="1" noRot="1" noChangeAspect="1" noMove="1" noResize="1" noEditPoints="1" noAdjustHandles="1" noChangeArrowheads="1" noChangeShapeType="1" noTextEdit="1"/>
+          </p:cNvSpPr>
+          <p:nvPr>
+            <p:extLst>
+              <p:ext uri="{386F3935-93C4-4BCD-93E2-E3B085C9AB24}">
+                <p16:designElem xmlns:p16="http://schemas.microsoft.com/office/powerpoint/2015/main" val="1"/>
+              </p:ext>
+            </p:extLst>
+          </p:nvPr>
+        </p:nvSpPr>
+        <p:spPr>
+          <a:xfrm>
+            <a:off x="0" y="0"/>
+            <a:ext cx="12192000" cy="6858000"/>
+          </a:xfrm>
+          <a:prstGeom prst="rect">
+            <a:avLst/>
+          </a:prstGeom>
+          <a:solidFill>
+            <a:schemeClr val="bg1"/>
+          </a:solidFill>
+          <a:ln w="12700" cap="flat" cmpd="sng" algn="ctr">
+            <a:noFill/>
+            <a:prstDash val="solid"/>
+            <a:miter lim="800000"/>
+          </a:ln>
+          <a:effectLst/>
+          <a:extLst>
+            <a:ext uri="{91240B29-F687-4F45-9708-019B960494DF}">
+              <a14:hiddenLine xmlns:a14="http://schemas.microsoft.com/office/drawing/2010/main" w="12700" cap="flat" cmpd="sng" algn="ctr">
+                <a:solidFill>
+                  <a:schemeClr val="accent1">
+                    <a:shade val="50000"/>
+                  </a:schemeClr>
+                </a:solidFill>
+                <a:prstDash val="solid"/>
+                <a:miter lim="800000"/>
+              </a14:hiddenLine>
+            </a:ext>
+          </a:extLst>
+        </p:spPr>
+        <p:style>
+          <a:lnRef idx="2">
+            <a:schemeClr val="accent1">
+              <a:shade val="50000"/>
+            </a:schemeClr>
+          </a:lnRef>
+          <a:fillRef idx="1">
+            <a:schemeClr val="accent1"/>
+          </a:fillRef>
+          <a:effectRef idx="0">
+            <a:schemeClr val="accent1"/>
+          </a:effectRef>
+          <a:fontRef idx="minor">
+            <a:schemeClr val="lt1"/>
+          </a:fontRef>
+        </p:style>
+        <p:txBody>
+          <a:bodyPr rtlCol="0" anchor="ctr"/>
+          <a:lstStyle/>
+          <a:p>
+            <a:pPr algn="ctr"/>
+            <a:endParaRPr lang="en-US"/>
+          </a:p>
+        </p:txBody>
+      </p:sp>
+      <p:sp>
+        <p:nvSpPr>
+          <p:cNvPr id="12" name="Rectangle 11">
+            <a:extLst>
+              <a:ext uri="{FF2B5EF4-FFF2-40B4-BE49-F238E27FC236}">
+                <a16:creationId xmlns:a16="http://schemas.microsoft.com/office/drawing/2014/main" id="{EBF87945-A001-489F-9D9B-7D9435F0B9CA}"/>
+              </a:ext>
+              <a:ext uri="{C183D7F6-B498-43B3-948B-1728B52AA6E4}">
+                <adec:decorative xmlns:adec="http://schemas.microsoft.com/office/drawing/2017/decorative" val="1"/>
+              </a:ext>
+            </a:extLst>
+          </p:cNvPr>
+          <p:cNvSpPr>
+            <a:spLocks noGrp="1" noRot="1" noChangeAspect="1" noMove="1" noResize="1" noEditPoints="1" noAdjustHandles="1" noChangeArrowheads="1" noChangeShapeType="1" noTextEdit="1"/>
+          </p:cNvSpPr>
+          <p:nvPr>
+            <p:extLst>
+              <p:ext uri="{386F3935-93C4-4BCD-93E2-E3B085C9AB24}">
+                <p16:designElem xmlns:p16="http://schemas.microsoft.com/office/powerpoint/2015/main" val="1"/>
+              </p:ext>
+            </p:extLst>
+          </p:nvPr>
+        </p:nvSpPr>
+        <p:spPr>
+          <a:xfrm>
+            <a:off x="548639" y="347471"/>
+            <a:ext cx="11100816" cy="1801368"/>
+          </a:xfrm>
+          <a:prstGeom prst="rect">
+            <a:avLst/>
+          </a:prstGeom>
+          <a:solidFill>
+            <a:schemeClr val="tx1">
+              <a:lumMod val="75000"/>
+              <a:lumOff val="25000"/>
+            </a:schemeClr>
+          </a:solidFill>
+          <a:ln>
+            <a:noFill/>
+          </a:ln>
+        </p:spPr>
+        <p:style>
+          <a:lnRef idx="2">
+            <a:schemeClr val="accent1">
+              <a:shade val="50000"/>
+            </a:schemeClr>
+          </a:lnRef>
+          <a:fillRef idx="1">
+            <a:schemeClr val="accent1"/>
+          </a:fillRef>
+          <a:effectRef idx="0">
+            <a:schemeClr val="accent1"/>
+          </a:effectRef>
+          <a:fontRef idx="minor">
+            <a:schemeClr val="lt1"/>
+          </a:fontRef>
+        </p:style>
+        <p:txBody>
+          <a:bodyPr rtlCol="0" anchor="ctr"/>
+          <a:lstStyle/>
+          <a:p>
+            <a:pPr algn="ctr"/>
+            <a:endParaRPr lang="en-US"/>
+          </a:p>
+        </p:txBody>
+      </p:sp>
+      <p:sp>
+        <p:nvSpPr>
           <p:cNvPr id="2" name="Title 1">
             <a:extLst>
               <a:ext uri="{FF2B5EF4-FFF2-40B4-BE49-F238E27FC236}">
@@ -6486,18 +7224,26 @@
             <p:ph type="title"/>
           </p:nvPr>
         </p:nvSpPr>
-        <p:spPr/>
-        <p:txBody>
-          <a:bodyPr/>
+        <p:spPr>
+          <a:xfrm>
+            <a:off x="838200" y="585216"/>
+            <a:ext cx="10515600" cy="1325563"/>
+          </a:xfrm>
+        </p:spPr>
+        <p:txBody>
+          <a:bodyPr vert="horz" lIns="91440" tIns="45720" rIns="91440" bIns="45720" rtlCol="0" anchor="ctr">
+            <a:normAutofit/>
+          </a:bodyPr>
           <a:lstStyle/>
           <a:p>
             <a:r>
               <a:rPr lang="en-US">
-                <a:cs typeface="Calibri Light"/>
+                <a:solidFill>
+                  <a:schemeClr val="bg1"/>
+                </a:solidFill>
               </a:rPr>
               <a:t>Game GUI V_3</a:t>
             </a:r>
-            <a:endParaRPr lang="en-US"/>
           </a:p>
         </p:txBody>
       </p:sp>
@@ -6517,17 +7263,19 @@
             <p:ph idx="1"/>
           </p:nvPr>
         </p:nvPicPr>
-        <p:blipFill>
+        <p:blipFill rotWithShape="1">
           <a:blip r:embed="rId2"/>
-          <a:stretch>
-            <a:fillRect/>
-          </a:stretch>
+          <a:srcRect r="4587" b="-1"/>
+          <a:stretch/>
         </p:blipFill>
         <p:spPr>
           <a:xfrm>
-            <a:off x="416502" y="1781969"/>
-            <a:ext cx="5779585" cy="3225956"/>
+            <a:off x="841248" y="2516777"/>
+            <a:ext cx="6236208" cy="3660185"/>
           </a:xfrm>
+          <a:prstGeom prst="rect">
+            <a:avLst/>
+          </a:prstGeom>
         </p:spPr>
       </p:pic>
       <p:sp>
@@ -6544,27 +7292,34 @@
         </p:nvSpPr>
         <p:spPr>
           <a:xfrm>
-            <a:off x="7409563" y="1630359"/>
-            <a:ext cx="2743200" cy="3139321"/>
+            <a:off x="7546848" y="2516777"/>
+            <a:ext cx="3803904" cy="3660185"/>
           </a:xfrm>
           <a:prstGeom prst="rect">
             <a:avLst/>
           </a:prstGeom>
-          <a:noFill/>
         </p:spPr>
         <p:txBody>
-          <a:bodyPr rot="0" spcFirstLastPara="0" vertOverflow="overflow" horzOverflow="overflow" vert="horz" wrap="square" lIns="91440" tIns="45720" rIns="91440" bIns="45720" numCol="1" spcCol="0" rtlCol="0" fromWordArt="0" anchor="t" anchorCtr="0" forceAA="0" compatLnSpc="1">
+          <a:bodyPr rot="0" spcFirstLastPara="0" vertOverflow="overflow" horzOverflow="overflow" vert="horz" lIns="91440" tIns="45720" rIns="91440" bIns="45720" numCol="1" spcCol="0" rtlCol="0" fromWordArt="0" anchor="ctr" anchorCtr="0" forceAA="0" compatLnSpc="1">
             <a:prstTxWarp prst="textNoShape">
               <a:avLst/>
             </a:prstTxWarp>
-            <a:spAutoFit/>
+            <a:normAutofit/>
           </a:bodyPr>
           <a:lstStyle/>
           <a:p>
+            <a:pPr indent="-228600">
+              <a:lnSpc>
+                <a:spcPct val="90000"/>
+              </a:lnSpc>
+              <a:spcAft>
+                <a:spcPts val="600"/>
+              </a:spcAft>
+              <a:buFont typeface="Arial" panose="020B0604020202020204" pitchFamily="34" charset="0"/>
+              <a:buChar char="•"/>
+            </a:pPr>
             <a:r>
-              <a:rPr lang="en-US">
-                <a:cs typeface="Calibri"/>
-              </a:rPr>
+              <a:rPr lang="en-US" sz="2200"/>
               <a:t>Have fixed the bit of my code that was broken and not allowing me to generate my questions and answers now that is working perfectly fine. I would like to add a help, export and stats button to my quiz before I can  move on to my history and stats Gui</a:t>
             </a:r>
           </a:p>
@@ -6583,9 +7338,17 @@
 </p:sld>
 </file>
 
-<file path=ppt/slides/slide15.xml><?xml version="1.0" encoding="utf-8"?>
+<file path=ppt/slides/slide16.xml><?xml version="1.0" encoding="utf-8"?>
 <p:sld xmlns:a="http://schemas.openxmlformats.org/drawingml/2006/main" xmlns:r="http://schemas.openxmlformats.org/officeDocument/2006/relationships" xmlns:p="http://schemas.openxmlformats.org/presentationml/2006/main">
   <p:cSld>
+    <p:bg>
+      <p:bgPr>
+        <a:solidFill>
+          <a:schemeClr val="bg1"/>
+        </a:solidFill>
+        <a:effectLst/>
+      </p:bgPr>
+    </p:bg>
     <p:spTree>
       <p:nvGrpSpPr>
         <p:cNvPr id="1" name=""/>
@@ -6602,6 +7365,151 @@
       </p:grpSpPr>
       <p:sp>
         <p:nvSpPr>
+          <p:cNvPr id="10" name="Rectangle 9">
+            <a:extLst>
+              <a:ext uri="{FF2B5EF4-FFF2-40B4-BE49-F238E27FC236}">
+                <a16:creationId xmlns:a16="http://schemas.microsoft.com/office/drawing/2014/main" id="{FF9B822F-893E-44C8-963C-64F50ACECBB2}"/>
+              </a:ext>
+              <a:ext uri="{C183D7F6-B498-43B3-948B-1728B52AA6E4}">
+                <adec:decorative xmlns:adec="http://schemas.microsoft.com/office/drawing/2017/decorative" val="1"/>
+              </a:ext>
+            </a:extLst>
+          </p:cNvPr>
+          <p:cNvSpPr>
+            <a:spLocks noGrp="1" noRot="1" noChangeAspect="1" noMove="1" noResize="1" noEditPoints="1" noAdjustHandles="1" noChangeArrowheads="1" noChangeShapeType="1" noTextEdit="1"/>
+          </p:cNvSpPr>
+          <p:nvPr>
+            <p:extLst>
+              <p:ext uri="{386F3935-93C4-4BCD-93E2-E3B085C9AB24}">
+                <p16:designElem xmlns:p16="http://schemas.microsoft.com/office/powerpoint/2015/main" val="1"/>
+              </p:ext>
+            </p:extLst>
+          </p:nvPr>
+        </p:nvSpPr>
+        <p:spPr>
+          <a:xfrm>
+            <a:off x="0" y="0"/>
+            <a:ext cx="12192000" cy="6858000"/>
+          </a:xfrm>
+          <a:prstGeom prst="rect">
+            <a:avLst/>
+          </a:prstGeom>
+          <a:solidFill>
+            <a:schemeClr val="bg1"/>
+          </a:solidFill>
+          <a:ln w="12700" cap="flat" cmpd="sng" algn="ctr">
+            <a:noFill/>
+            <a:prstDash val="solid"/>
+            <a:miter lim="800000"/>
+          </a:ln>
+          <a:effectLst/>
+          <a:extLst>
+            <a:ext uri="{91240B29-F687-4F45-9708-019B960494DF}">
+              <a14:hiddenLine xmlns:a14="http://schemas.microsoft.com/office/drawing/2010/main" w="12700" cap="flat" cmpd="sng" algn="ctr">
+                <a:solidFill>
+                  <a:schemeClr val="accent1">
+                    <a:shade val="50000"/>
+                  </a:schemeClr>
+                </a:solidFill>
+                <a:prstDash val="solid"/>
+                <a:miter lim="800000"/>
+              </a14:hiddenLine>
+            </a:ext>
+          </a:extLst>
+        </p:spPr>
+        <p:style>
+          <a:lnRef idx="2">
+            <a:schemeClr val="accent1">
+              <a:shade val="50000"/>
+            </a:schemeClr>
+          </a:lnRef>
+          <a:fillRef idx="1">
+            <a:schemeClr val="accent1"/>
+          </a:fillRef>
+          <a:effectRef idx="0">
+            <a:schemeClr val="accent1"/>
+          </a:effectRef>
+          <a:fontRef idx="minor">
+            <a:schemeClr val="lt1"/>
+          </a:fontRef>
+        </p:style>
+        <p:txBody>
+          <a:bodyPr rtlCol="0" anchor="ctr"/>
+          <a:lstStyle/>
+          <a:p>
+            <a:pPr algn="ctr"/>
+            <a:endParaRPr lang="en-US"/>
+          </a:p>
+        </p:txBody>
+      </p:sp>
+      <p:sp>
+        <p:nvSpPr>
+          <p:cNvPr id="12" name="Rectangle 11">
+            <a:extLst>
+              <a:ext uri="{FF2B5EF4-FFF2-40B4-BE49-F238E27FC236}">
+                <a16:creationId xmlns:a16="http://schemas.microsoft.com/office/drawing/2014/main" id="{EBF87945-A001-489F-9D9B-7D9435F0B9CA}"/>
+              </a:ext>
+              <a:ext uri="{C183D7F6-B498-43B3-948B-1728B52AA6E4}">
+                <adec:decorative xmlns:adec="http://schemas.microsoft.com/office/drawing/2017/decorative" val="1"/>
+              </a:ext>
+            </a:extLst>
+          </p:cNvPr>
+          <p:cNvSpPr>
+            <a:spLocks noGrp="1" noRot="1" noChangeAspect="1" noMove="1" noResize="1" noEditPoints="1" noAdjustHandles="1" noChangeArrowheads="1" noChangeShapeType="1" noTextEdit="1"/>
+          </p:cNvSpPr>
+          <p:nvPr>
+            <p:extLst>
+              <p:ext uri="{386F3935-93C4-4BCD-93E2-E3B085C9AB24}">
+                <p16:designElem xmlns:p16="http://schemas.microsoft.com/office/powerpoint/2015/main" val="1"/>
+              </p:ext>
+            </p:extLst>
+          </p:nvPr>
+        </p:nvSpPr>
+        <p:spPr>
+          <a:xfrm>
+            <a:off x="548639" y="347471"/>
+            <a:ext cx="11100816" cy="1801368"/>
+          </a:xfrm>
+          <a:prstGeom prst="rect">
+            <a:avLst/>
+          </a:prstGeom>
+          <a:solidFill>
+            <a:schemeClr val="tx1">
+              <a:lumMod val="75000"/>
+              <a:lumOff val="25000"/>
+            </a:schemeClr>
+          </a:solidFill>
+          <a:ln>
+            <a:noFill/>
+          </a:ln>
+        </p:spPr>
+        <p:style>
+          <a:lnRef idx="2">
+            <a:schemeClr val="accent1">
+              <a:shade val="50000"/>
+            </a:schemeClr>
+          </a:lnRef>
+          <a:fillRef idx="1">
+            <a:schemeClr val="accent1"/>
+          </a:fillRef>
+          <a:effectRef idx="0">
+            <a:schemeClr val="accent1"/>
+          </a:effectRef>
+          <a:fontRef idx="minor">
+            <a:schemeClr val="lt1"/>
+          </a:fontRef>
+        </p:style>
+        <p:txBody>
+          <a:bodyPr rtlCol="0" anchor="ctr"/>
+          <a:lstStyle/>
+          <a:p>
+            <a:pPr algn="ctr"/>
+            <a:endParaRPr lang="en-US"/>
+          </a:p>
+        </p:txBody>
+      </p:sp>
+      <p:sp>
+        <p:nvSpPr>
           <p:cNvPr id="2" name="Title 1">
             <a:extLst>
               <a:ext uri="{FF2B5EF4-FFF2-40B4-BE49-F238E27FC236}">
@@ -6616,24 +7524,26 @@
             <p:ph type="title"/>
           </p:nvPr>
         </p:nvSpPr>
-        <p:spPr/>
-        <p:txBody>
-          <a:bodyPr/>
+        <p:spPr>
+          <a:xfrm>
+            <a:off x="838200" y="585216"/>
+            <a:ext cx="10515600" cy="1325563"/>
+          </a:xfrm>
+        </p:spPr>
+        <p:txBody>
+          <a:bodyPr vert="horz" lIns="91440" tIns="45720" rIns="91440" bIns="45720" rtlCol="0" anchor="ctr">
+            <a:normAutofit/>
+          </a:bodyPr>
           <a:lstStyle/>
           <a:p>
-            <a:r>
-              <a:rPr lang="en-US" err="1">
-                <a:cs typeface="Calibri Light"/>
-              </a:rPr>
-              <a:t>Game_GUI</a:t>
-            </a:r>
             <a:r>
               <a:rPr lang="en-US">
-                <a:cs typeface="Calibri Light"/>
+                <a:solidFill>
+                  <a:schemeClr val="bg1"/>
+                </a:solidFill>
               </a:rPr>
-              <a:t> DONE</a:t>
+              <a:t>Game_GUI V_4</a:t>
             </a:r>
-            <a:endParaRPr lang="en-US"/>
           </a:p>
         </p:txBody>
       </p:sp>
@@ -6653,17 +7563,19 @@
             <p:ph idx="1"/>
           </p:nvPr>
         </p:nvPicPr>
-        <p:blipFill>
+        <p:blipFill rotWithShape="1">
           <a:blip r:embed="rId2"/>
-          <a:stretch>
-            <a:fillRect/>
-          </a:stretch>
+          <a:srcRect t="4623" r="3" b="2951"/>
+          <a:stretch/>
         </p:blipFill>
         <p:spPr>
           <a:xfrm>
-            <a:off x="375090" y="1825625"/>
-            <a:ext cx="6852501" cy="4351338"/>
+            <a:off x="841248" y="2516777"/>
+            <a:ext cx="6236208" cy="3660185"/>
           </a:xfrm>
+          <a:prstGeom prst="rect">
+            <a:avLst/>
+          </a:prstGeom>
         </p:spPr>
       </p:pic>
       <p:sp>
@@ -6680,27 +7592,34 @@
         </p:nvSpPr>
         <p:spPr>
           <a:xfrm>
-            <a:off x="7660888" y="1825083"/>
-            <a:ext cx="3198541" cy="646331"/>
+            <a:off x="7546848" y="2516777"/>
+            <a:ext cx="3803904" cy="3660185"/>
           </a:xfrm>
           <a:prstGeom prst="rect">
             <a:avLst/>
           </a:prstGeom>
-          <a:noFill/>
         </p:spPr>
         <p:txBody>
-          <a:bodyPr rot="0" spcFirstLastPara="0" vertOverflow="overflow" horzOverflow="overflow" vert="horz" wrap="square" lIns="91440" tIns="45720" rIns="91440" bIns="45720" numCol="1" spcCol="0" rtlCol="0" fromWordArt="0" anchor="t" anchorCtr="0" forceAA="0" compatLnSpc="1">
+          <a:bodyPr rot="0" spcFirstLastPara="0" vertOverflow="overflow" horzOverflow="overflow" vert="horz" lIns="91440" tIns="45720" rIns="91440" bIns="45720" numCol="1" spcCol="0" rtlCol="0" fromWordArt="0" anchor="ctr" anchorCtr="0" forceAA="0" compatLnSpc="1">
             <a:prstTxWarp prst="textNoShape">
               <a:avLst/>
             </a:prstTxWarp>
-            <a:spAutoFit/>
+            <a:normAutofit/>
           </a:bodyPr>
           <a:lstStyle/>
           <a:p>
+            <a:pPr indent="-228600">
+              <a:lnSpc>
+                <a:spcPct val="90000"/>
+              </a:lnSpc>
+              <a:spcAft>
+                <a:spcPts val="600"/>
+              </a:spcAft>
+              <a:buFont typeface="Arial" panose="020B0604020202020204" pitchFamily="34" charset="0"/>
+              <a:buChar char="•"/>
+            </a:pPr>
             <a:r>
-              <a:rPr lang="en-US">
-                <a:cs typeface="Calibri"/>
-              </a:rPr>
+              <a:rPr lang="en-US" sz="2200"/>
               <a:t>Added help button. This is final version of game class</a:t>
             </a:r>
           </a:p>
@@ -6716,12 +7635,112 @@
   <p:clrMapOvr>
     <a:masterClrMapping/>
   </p:clrMapOvr>
+  <p:timing>
+    <p:tnLst>
+      <p:par>
+        <p:cTn id="1" dur="indefinite" restart="never" nodeType="tmRoot">
+          <p:childTnLst>
+            <p:seq concurrent="1" nextAc="seek">
+              <p:cTn id="2" dur="indefinite" nodeType="mainSeq">
+                <p:childTnLst>
+                  <p:par>
+                    <p:cTn id="3" fill="hold">
+                      <p:stCondLst>
+                        <p:cond delay="indefinite"/>
+                        <p:cond evt="onBegin" delay="0">
+                          <p:tn val="2"/>
+                        </p:cond>
+                      </p:stCondLst>
+                      <p:childTnLst>
+                        <p:par>
+                          <p:cTn id="4" fill="hold">
+                            <p:stCondLst>
+                              <p:cond delay="0"/>
+                            </p:stCondLst>
+                            <p:childTnLst>
+                              <p:par>
+                                <p:cTn id="5" presetID="10" presetClass="entr" presetSubtype="0" fill="hold" grpId="0" nodeType="withEffect">
+                                  <p:stCondLst>
+                                    <p:cond delay="1000"/>
+                                  </p:stCondLst>
+                                  <p:iterate>
+                                    <p:tmPct val="10000"/>
+                                  </p:iterate>
+                                  <p:childTnLst>
+                                    <p:set>
+                                      <p:cBhvr>
+                                        <p:cTn id="6" dur="1" fill="hold">
+                                          <p:stCondLst>
+                                            <p:cond delay="0"/>
+                                          </p:stCondLst>
+                                        </p:cTn>
+                                        <p:tgtEl>
+                                          <p:spTgt spid="2"/>
+                                        </p:tgtEl>
+                                        <p:attrNameLst>
+                                          <p:attrName>style.visibility</p:attrName>
+                                        </p:attrNameLst>
+                                      </p:cBhvr>
+                                      <p:to>
+                                        <p:strVal val="visible"/>
+                                      </p:to>
+                                    </p:set>
+                                    <p:animEffect transition="in" filter="fade">
+                                      <p:cBhvr>
+                                        <p:cTn id="7" dur="700"/>
+                                        <p:tgtEl>
+                                          <p:spTgt spid="2"/>
+                                        </p:tgtEl>
+                                      </p:cBhvr>
+                                    </p:animEffect>
+                                  </p:childTnLst>
+                                </p:cTn>
+                              </p:par>
+                            </p:childTnLst>
+                          </p:cTn>
+                        </p:par>
+                      </p:childTnLst>
+                    </p:cTn>
+                  </p:par>
+                </p:childTnLst>
+              </p:cTn>
+              <p:prevCondLst>
+                <p:cond evt="onPrev" delay="0">
+                  <p:tgtEl>
+                    <p:sldTgt/>
+                  </p:tgtEl>
+                </p:cond>
+              </p:prevCondLst>
+              <p:nextCondLst>
+                <p:cond evt="onNext" delay="0">
+                  <p:tgtEl>
+                    <p:sldTgt/>
+                  </p:tgtEl>
+                </p:cond>
+              </p:nextCondLst>
+            </p:seq>
+          </p:childTnLst>
+        </p:cTn>
+      </p:par>
+    </p:tnLst>
+    <p:bldLst>
+      <p:bldP spid="2" grpId="0"/>
+    </p:bldLst>
+  </p:timing>
 </p:sld>
 </file>
 
-<file path=ppt/slides/slide16.xml><?xml version="1.0" encoding="utf-8"?>
+<file path=ppt/slides/slide17.xml><?xml version="1.0" encoding="utf-8"?>
 <p:sld xmlns:a="http://schemas.openxmlformats.org/drawingml/2006/main" xmlns:r="http://schemas.openxmlformats.org/officeDocument/2006/relationships" xmlns:p="http://schemas.openxmlformats.org/presentationml/2006/main">
   <p:cSld>
+    <p:bg>
+      <p:bgPr>
+        <a:solidFill>
+          <a:schemeClr val="bg1"/>
+        </a:solidFill>
+        <a:effectLst/>
+      </p:bgPr>
+    </p:bg>
     <p:spTree>
       <p:nvGrpSpPr>
         <p:cNvPr id="1" name=""/>
@@ -6738,10 +7757,155 @@
       </p:grpSpPr>
       <p:sp>
         <p:nvSpPr>
+          <p:cNvPr id="10" name="Rectangle 9">
+            <a:extLst>
+              <a:ext uri="{FF2B5EF4-FFF2-40B4-BE49-F238E27FC236}">
+                <a16:creationId xmlns:a16="http://schemas.microsoft.com/office/drawing/2014/main" id="{FF9B822F-893E-44C8-963C-64F50ACECBB2}"/>
+              </a:ext>
+              <a:ext uri="{C183D7F6-B498-43B3-948B-1728B52AA6E4}">
+                <adec:decorative xmlns:adec="http://schemas.microsoft.com/office/drawing/2017/decorative" val="1"/>
+              </a:ext>
+            </a:extLst>
+          </p:cNvPr>
+          <p:cNvSpPr>
+            <a:spLocks noGrp="1" noRot="1" noChangeAspect="1" noMove="1" noResize="1" noEditPoints="1" noAdjustHandles="1" noChangeArrowheads="1" noChangeShapeType="1" noTextEdit="1"/>
+          </p:cNvSpPr>
+          <p:nvPr>
+            <p:extLst>
+              <p:ext uri="{386F3935-93C4-4BCD-93E2-E3B085C9AB24}">
+                <p16:designElem xmlns:p16="http://schemas.microsoft.com/office/powerpoint/2015/main" val="1"/>
+              </p:ext>
+            </p:extLst>
+          </p:nvPr>
+        </p:nvSpPr>
+        <p:spPr>
+          <a:xfrm>
+            <a:off x="0" y="0"/>
+            <a:ext cx="12192000" cy="6858000"/>
+          </a:xfrm>
+          <a:prstGeom prst="rect">
+            <a:avLst/>
+          </a:prstGeom>
+          <a:solidFill>
+            <a:schemeClr val="bg1"/>
+          </a:solidFill>
+          <a:ln w="12700" cap="flat" cmpd="sng" algn="ctr">
+            <a:noFill/>
+            <a:prstDash val="solid"/>
+            <a:miter lim="800000"/>
+          </a:ln>
+          <a:effectLst/>
+          <a:extLst>
+            <a:ext uri="{91240B29-F687-4F45-9708-019B960494DF}">
+              <a14:hiddenLine xmlns:a14="http://schemas.microsoft.com/office/drawing/2010/main" w="12700" cap="flat" cmpd="sng" algn="ctr">
+                <a:solidFill>
+                  <a:schemeClr val="accent1">
+                    <a:shade val="50000"/>
+                  </a:schemeClr>
+                </a:solidFill>
+                <a:prstDash val="solid"/>
+                <a:miter lim="800000"/>
+              </a14:hiddenLine>
+            </a:ext>
+          </a:extLst>
+        </p:spPr>
+        <p:style>
+          <a:lnRef idx="2">
+            <a:schemeClr val="accent1">
+              <a:shade val="50000"/>
+            </a:schemeClr>
+          </a:lnRef>
+          <a:fillRef idx="1">
+            <a:schemeClr val="accent1"/>
+          </a:fillRef>
+          <a:effectRef idx="0">
+            <a:schemeClr val="accent1"/>
+          </a:effectRef>
+          <a:fontRef idx="minor">
+            <a:schemeClr val="lt1"/>
+          </a:fontRef>
+        </p:style>
+        <p:txBody>
+          <a:bodyPr rtlCol="0" anchor="ctr"/>
+          <a:lstStyle/>
+          <a:p>
+            <a:pPr algn="ctr"/>
+            <a:endParaRPr lang="en-US"/>
+          </a:p>
+        </p:txBody>
+      </p:sp>
+      <p:sp>
+        <p:nvSpPr>
+          <p:cNvPr id="12" name="Rectangle 11">
+            <a:extLst>
+              <a:ext uri="{FF2B5EF4-FFF2-40B4-BE49-F238E27FC236}">
+                <a16:creationId xmlns:a16="http://schemas.microsoft.com/office/drawing/2014/main" id="{EBF87945-A001-489F-9D9B-7D9435F0B9CA}"/>
+              </a:ext>
+              <a:ext uri="{C183D7F6-B498-43B3-948B-1728B52AA6E4}">
+                <adec:decorative xmlns:adec="http://schemas.microsoft.com/office/drawing/2017/decorative" val="1"/>
+              </a:ext>
+            </a:extLst>
+          </p:cNvPr>
+          <p:cNvSpPr>
+            <a:spLocks noGrp="1" noRot="1" noChangeAspect="1" noMove="1" noResize="1" noEditPoints="1" noAdjustHandles="1" noChangeArrowheads="1" noChangeShapeType="1" noTextEdit="1"/>
+          </p:cNvSpPr>
+          <p:nvPr>
+            <p:extLst>
+              <p:ext uri="{386F3935-93C4-4BCD-93E2-E3B085C9AB24}">
+                <p16:designElem xmlns:p16="http://schemas.microsoft.com/office/powerpoint/2015/main" val="1"/>
+              </p:ext>
+            </p:extLst>
+          </p:nvPr>
+        </p:nvSpPr>
+        <p:spPr>
+          <a:xfrm>
+            <a:off x="548639" y="347471"/>
+            <a:ext cx="11100816" cy="1801368"/>
+          </a:xfrm>
+          <a:prstGeom prst="rect">
+            <a:avLst/>
+          </a:prstGeom>
+          <a:solidFill>
+            <a:schemeClr val="tx1">
+              <a:lumMod val="75000"/>
+              <a:lumOff val="25000"/>
+            </a:schemeClr>
+          </a:solidFill>
+          <a:ln>
+            <a:noFill/>
+          </a:ln>
+        </p:spPr>
+        <p:style>
+          <a:lnRef idx="2">
+            <a:schemeClr val="accent1">
+              <a:shade val="50000"/>
+            </a:schemeClr>
+          </a:lnRef>
+          <a:fillRef idx="1">
+            <a:schemeClr val="accent1"/>
+          </a:fillRef>
+          <a:effectRef idx="0">
+            <a:schemeClr val="accent1"/>
+          </a:effectRef>
+          <a:fontRef idx="minor">
+            <a:schemeClr val="lt1"/>
+          </a:fontRef>
+        </p:style>
+        <p:txBody>
+          <a:bodyPr rtlCol="0" anchor="ctr"/>
+          <a:lstStyle/>
+          <a:p>
+            <a:pPr algn="ctr"/>
+            <a:endParaRPr lang="en-US"/>
+          </a:p>
+        </p:txBody>
+      </p:sp>
+      <p:sp>
+        <p:nvSpPr>
           <p:cNvPr id="2" name="Title 1">
             <a:extLst>
               <a:ext uri="{FF2B5EF4-FFF2-40B4-BE49-F238E27FC236}">
-                <a16:creationId xmlns:a16="http://schemas.microsoft.com/office/drawing/2014/main" id="{8F9B19EB-AE66-4095-9B45-4E189A272D7C}"/>
+                <a16:creationId xmlns:a16="http://schemas.microsoft.com/office/drawing/2014/main" id="{82FB8FBF-1031-46B5-A87C-F43678C019B8}"/>
               </a:ext>
             </a:extLst>
           </p:cNvPr>
@@ -6752,33 +7916,91 @@
             <p:ph type="title"/>
           </p:nvPr>
         </p:nvSpPr>
-        <p:spPr/>
-        <p:txBody>
-          <a:bodyPr/>
+        <p:spPr>
+          <a:xfrm>
+            <a:off x="838200" y="585216"/>
+            <a:ext cx="10515600" cy="1325563"/>
+          </a:xfrm>
+        </p:spPr>
+        <p:txBody>
+          <a:bodyPr vert="horz" lIns="91440" tIns="45720" rIns="91440" bIns="45720" rtlCol="0" anchor="ctr">
+            <a:normAutofit/>
+          </a:bodyPr>
           <a:lstStyle/>
           <a:p>
             <a:r>
-              <a:rPr lang="en-US" err="1">
-                <a:cs typeface="Calibri Light"/>
+              <a:rPr lang="en-US">
+                <a:solidFill>
+                  <a:schemeClr val="bg1"/>
+                </a:solidFill>
               </a:rPr>
-              <a:t>Help_GUI</a:t>
+              <a:t>Game_GUI Final </a:t>
+            </a:r>
+          </a:p>
+        </p:txBody>
+      </p:sp>
+      <p:sp>
+        <p:nvSpPr>
+          <p:cNvPr id="5" name="TextBox 4">
+            <a:extLst>
+              <a:ext uri="{FF2B5EF4-FFF2-40B4-BE49-F238E27FC236}">
+                <a16:creationId xmlns:a16="http://schemas.microsoft.com/office/drawing/2014/main" id="{6BD91205-CFFE-4DB2-B4FA-3B66A4D4EB17}"/>
+              </a:ext>
+            </a:extLst>
+          </p:cNvPr>
+          <p:cNvSpPr txBox="1"/>
+          <p:nvPr/>
+        </p:nvSpPr>
+        <p:spPr>
+          <a:xfrm>
+            <a:off x="177751" y="4691264"/>
+            <a:ext cx="3813196" cy="723698"/>
+          </a:xfrm>
+          <a:prstGeom prst="rect">
+            <a:avLst/>
+          </a:prstGeom>
+        </p:spPr>
+        <p:txBody>
+          <a:bodyPr rot="0" spcFirstLastPara="0" vertOverflow="overflow" horzOverflow="overflow" vert="horz" lIns="91440" tIns="45720" rIns="91440" bIns="45720" numCol="1" spcCol="0" rtlCol="0" fromWordArt="0" anchor="ctr" anchorCtr="0" forceAA="0" compatLnSpc="1">
+            <a:prstTxWarp prst="textNoShape">
+              <a:avLst/>
+            </a:prstTxWarp>
+            <a:normAutofit lnSpcReduction="10000"/>
+          </a:bodyPr>
+          <a:lstStyle/>
+          <a:p>
+            <a:pPr>
+              <a:lnSpc>
+                <a:spcPct val="90000"/>
+              </a:lnSpc>
+              <a:spcAft>
+                <a:spcPts val="600"/>
+              </a:spcAft>
+            </a:pPr>
+            <a:r>
+              <a:rPr lang="en-US" sz="1200" dirty="0"/>
+              <a:t>This is the final version of my game </a:t>
             </a:r>
             <a:r>
-              <a:rPr lang="en-US">
-                <a:cs typeface="Calibri Light"/>
-              </a:rPr>
-              <a:t> V1</a:t>
+              <a:rPr lang="en-US" sz="1200" dirty="0" err="1"/>
+              <a:t>gui</a:t>
             </a:r>
-            <a:endParaRPr lang="en-US"/>
+            <a:r>
+              <a:rPr lang="en-US" sz="1200" dirty="0"/>
+              <a:t>. I have added the export/save button and have made sure that my question generation is working perfectly fine. I will now work on my help classes and then my history class.</a:t>
+            </a:r>
+            <a:endParaRPr lang="en-US" sz="1200" dirty="0">
+              <a:cs typeface="Calibri"/>
+            </a:endParaRPr>
           </a:p>
         </p:txBody>
       </p:sp>
       <p:pic>
         <p:nvPicPr>
-          <p:cNvPr id="4" name="Picture 4" descr="Graphical user interface, text, application&#10;&#10;Description automatically generated">
+          <p:cNvPr id="8" name="Picture 8" descr="Timeline&#10;&#10;Description automatically generated">
             <a:extLst>
               <a:ext uri="{FF2B5EF4-FFF2-40B4-BE49-F238E27FC236}">
-                <a16:creationId xmlns:a16="http://schemas.microsoft.com/office/drawing/2014/main" id="{8438ADBC-F5AF-4A8A-85E8-EE67AC40482F}"/>
+                <a16:creationId xmlns:a16="http://schemas.microsoft.com/office/drawing/2014/main" id="{D7FC79EA-84EE-4982-9317-98CCF21BC847}"/>
               </a:ext>
             </a:extLst>
           </p:cNvPr>
@@ -6797,17 +8019,47 @@
         </p:blipFill>
         <p:spPr>
           <a:xfrm>
-            <a:off x="839710" y="1519334"/>
-            <a:ext cx="3152775" cy="1971675"/>
+            <a:off x="547234" y="2122991"/>
+            <a:ext cx="2538971" cy="2399875"/>
           </a:xfrm>
         </p:spPr>
       </p:pic>
-      <p:sp>
-        <p:nvSpPr>
-          <p:cNvPr id="5" name="TextBox 4">
+      <p:pic>
+        <p:nvPicPr>
+          <p:cNvPr id="9" name="Picture 10" descr="Timeline&#10;&#10;Description automatically generated">
             <a:extLst>
               <a:ext uri="{FF2B5EF4-FFF2-40B4-BE49-F238E27FC236}">
-                <a16:creationId xmlns:a16="http://schemas.microsoft.com/office/drawing/2014/main" id="{2451DC0A-CE8C-4807-BE9D-490B61D1DB52}"/>
+                <a16:creationId xmlns:a16="http://schemas.microsoft.com/office/drawing/2014/main" id="{750F2E14-5FA7-47BD-97CC-8BC03DBB67FA}"/>
+              </a:ext>
+            </a:extLst>
+          </p:cNvPr>
+          <p:cNvPicPr>
+            <a:picLocks noChangeAspect="1"/>
+          </p:cNvPicPr>
+          <p:nvPr/>
+        </p:nvPicPr>
+        <p:blipFill>
+          <a:blip r:embed="rId3"/>
+          <a:stretch>
+            <a:fillRect/>
+          </a:stretch>
+        </p:blipFill>
+        <p:spPr>
+          <a:xfrm>
+            <a:off x="9091961" y="2150809"/>
+            <a:ext cx="2557347" cy="2398409"/>
+          </a:xfrm>
+          <a:prstGeom prst="rect">
+            <a:avLst/>
+          </a:prstGeom>
+        </p:spPr>
+      </p:pic>
+      <p:sp>
+        <p:nvSpPr>
+          <p:cNvPr id="13" name="TextBox 12">
+            <a:extLst>
+              <a:ext uri="{FF2B5EF4-FFF2-40B4-BE49-F238E27FC236}">
+                <a16:creationId xmlns:a16="http://schemas.microsoft.com/office/drawing/2014/main" id="{F13D55FB-4924-4928-8E29-4D38F59B4ECB}"/>
               </a:ext>
             </a:extLst>
           </p:cNvPr>
@@ -6816,8 +8068,8 @@
         </p:nvSpPr>
         <p:spPr>
           <a:xfrm>
-            <a:off x="5123985" y="1713570"/>
-            <a:ext cx="3468029" cy="1200329"/>
+            <a:off x="9002519" y="4644251"/>
+            <a:ext cx="2743200" cy="923330"/>
           </a:xfrm>
           <a:prstGeom prst="rect">
             <a:avLst/>
@@ -6834,10 +8086,10 @@
           <a:lstStyle/>
           <a:p>
             <a:r>
-              <a:rPr lang="en-US">
+              <a:rPr lang="en-US" dirty="0">
                 <a:cs typeface="Calibri"/>
               </a:rPr>
-              <a:t>First version of my help class. It is working and doing what it needs to. I can now shift my attention to my history and export classes.</a:t>
+              <a:t>I have changed where the Question so it is easier to identify it.</a:t>
             </a:r>
           </a:p>
         </p:txBody>
@@ -6845,7 +8097,7 @@
     </p:spTree>
     <p:extLst>
       <p:ext uri="{BB962C8B-B14F-4D97-AF65-F5344CB8AC3E}">
-        <p14:creationId xmlns:p14="http://schemas.microsoft.com/office/powerpoint/2010/main" val="1147695793"/>
+        <p14:creationId xmlns:p14="http://schemas.microsoft.com/office/powerpoint/2010/main" val="794014388"/>
       </p:ext>
     </p:extLst>
   </p:cSld>
@@ -6855,9 +8107,17 @@
 </p:sld>
 </file>
 
-<file path=ppt/slides/slide17.xml><?xml version="1.0" encoding="utf-8"?>
+<file path=ppt/slides/slide18.xml><?xml version="1.0" encoding="utf-8"?>
 <p:sld xmlns:a="http://schemas.openxmlformats.org/drawingml/2006/main" xmlns:r="http://schemas.openxmlformats.org/officeDocument/2006/relationships" xmlns:p="http://schemas.openxmlformats.org/presentationml/2006/main">
   <p:cSld>
+    <p:bg>
+      <p:bgPr>
+        <a:solidFill>
+          <a:schemeClr val="bg1"/>
+        </a:solidFill>
+        <a:effectLst/>
+      </p:bgPr>
+    </p:bg>
     <p:spTree>
       <p:nvGrpSpPr>
         <p:cNvPr id="1" name=""/>
@@ -6874,10 +8134,155 @@
       </p:grpSpPr>
       <p:sp>
         <p:nvSpPr>
+          <p:cNvPr id="10" name="Rectangle 9">
+            <a:extLst>
+              <a:ext uri="{FF2B5EF4-FFF2-40B4-BE49-F238E27FC236}">
+                <a16:creationId xmlns:a16="http://schemas.microsoft.com/office/drawing/2014/main" id="{FF9B822F-893E-44C8-963C-64F50ACECBB2}"/>
+              </a:ext>
+              <a:ext uri="{C183D7F6-B498-43B3-948B-1728B52AA6E4}">
+                <adec:decorative xmlns:adec="http://schemas.microsoft.com/office/drawing/2017/decorative" val="1"/>
+              </a:ext>
+            </a:extLst>
+          </p:cNvPr>
+          <p:cNvSpPr>
+            <a:spLocks noGrp="1" noRot="1" noChangeAspect="1" noMove="1" noResize="1" noEditPoints="1" noAdjustHandles="1" noChangeArrowheads="1" noChangeShapeType="1" noTextEdit="1"/>
+          </p:cNvSpPr>
+          <p:nvPr>
+            <p:extLst>
+              <p:ext uri="{386F3935-93C4-4BCD-93E2-E3B085C9AB24}">
+                <p16:designElem xmlns:p16="http://schemas.microsoft.com/office/powerpoint/2015/main" val="1"/>
+              </p:ext>
+            </p:extLst>
+          </p:nvPr>
+        </p:nvSpPr>
+        <p:spPr>
+          <a:xfrm>
+            <a:off x="0" y="0"/>
+            <a:ext cx="12192000" cy="6858000"/>
+          </a:xfrm>
+          <a:prstGeom prst="rect">
+            <a:avLst/>
+          </a:prstGeom>
+          <a:solidFill>
+            <a:schemeClr val="bg1"/>
+          </a:solidFill>
+          <a:ln w="12700" cap="flat" cmpd="sng" algn="ctr">
+            <a:noFill/>
+            <a:prstDash val="solid"/>
+            <a:miter lim="800000"/>
+          </a:ln>
+          <a:effectLst/>
+          <a:extLst>
+            <a:ext uri="{91240B29-F687-4F45-9708-019B960494DF}">
+              <a14:hiddenLine xmlns:a14="http://schemas.microsoft.com/office/drawing/2010/main" w="12700" cap="flat" cmpd="sng" algn="ctr">
+                <a:solidFill>
+                  <a:schemeClr val="accent1">
+                    <a:shade val="50000"/>
+                  </a:schemeClr>
+                </a:solidFill>
+                <a:prstDash val="solid"/>
+                <a:miter lim="800000"/>
+              </a14:hiddenLine>
+            </a:ext>
+          </a:extLst>
+        </p:spPr>
+        <p:style>
+          <a:lnRef idx="2">
+            <a:schemeClr val="accent1">
+              <a:shade val="50000"/>
+            </a:schemeClr>
+          </a:lnRef>
+          <a:fillRef idx="1">
+            <a:schemeClr val="accent1"/>
+          </a:fillRef>
+          <a:effectRef idx="0">
+            <a:schemeClr val="accent1"/>
+          </a:effectRef>
+          <a:fontRef idx="minor">
+            <a:schemeClr val="lt1"/>
+          </a:fontRef>
+        </p:style>
+        <p:txBody>
+          <a:bodyPr rtlCol="0" anchor="ctr"/>
+          <a:lstStyle/>
+          <a:p>
+            <a:pPr algn="ctr"/>
+            <a:endParaRPr lang="en-US"/>
+          </a:p>
+        </p:txBody>
+      </p:sp>
+      <p:sp>
+        <p:nvSpPr>
+          <p:cNvPr id="12" name="Rectangle 11">
+            <a:extLst>
+              <a:ext uri="{FF2B5EF4-FFF2-40B4-BE49-F238E27FC236}">
+                <a16:creationId xmlns:a16="http://schemas.microsoft.com/office/drawing/2014/main" id="{EBF87945-A001-489F-9D9B-7D9435F0B9CA}"/>
+              </a:ext>
+              <a:ext uri="{C183D7F6-B498-43B3-948B-1728B52AA6E4}">
+                <adec:decorative xmlns:adec="http://schemas.microsoft.com/office/drawing/2017/decorative" val="1"/>
+              </a:ext>
+            </a:extLst>
+          </p:cNvPr>
+          <p:cNvSpPr>
+            <a:spLocks noGrp="1" noRot="1" noChangeAspect="1" noMove="1" noResize="1" noEditPoints="1" noAdjustHandles="1" noChangeArrowheads="1" noChangeShapeType="1" noTextEdit="1"/>
+          </p:cNvSpPr>
+          <p:nvPr>
+            <p:extLst>
+              <p:ext uri="{386F3935-93C4-4BCD-93E2-E3B085C9AB24}">
+                <p16:designElem xmlns:p16="http://schemas.microsoft.com/office/powerpoint/2015/main" val="1"/>
+              </p:ext>
+            </p:extLst>
+          </p:nvPr>
+        </p:nvSpPr>
+        <p:spPr>
+          <a:xfrm>
+            <a:off x="548639" y="347471"/>
+            <a:ext cx="11100816" cy="1801368"/>
+          </a:xfrm>
+          <a:prstGeom prst="rect">
+            <a:avLst/>
+          </a:prstGeom>
+          <a:solidFill>
+            <a:schemeClr val="tx1">
+              <a:lumMod val="75000"/>
+              <a:lumOff val="25000"/>
+            </a:schemeClr>
+          </a:solidFill>
+          <a:ln>
+            <a:noFill/>
+          </a:ln>
+        </p:spPr>
+        <p:style>
+          <a:lnRef idx="2">
+            <a:schemeClr val="accent1">
+              <a:shade val="50000"/>
+            </a:schemeClr>
+          </a:lnRef>
+          <a:fillRef idx="1">
+            <a:schemeClr val="accent1"/>
+          </a:fillRef>
+          <a:effectRef idx="0">
+            <a:schemeClr val="accent1"/>
+          </a:effectRef>
+          <a:fontRef idx="minor">
+            <a:schemeClr val="lt1"/>
+          </a:fontRef>
+        </p:style>
+        <p:txBody>
+          <a:bodyPr rtlCol="0" anchor="ctr"/>
+          <a:lstStyle/>
+          <a:p>
+            <a:pPr algn="ctr"/>
+            <a:endParaRPr lang="en-US"/>
+          </a:p>
+        </p:txBody>
+      </p:sp>
+      <p:sp>
+        <p:nvSpPr>
           <p:cNvPr id="2" name="Title 1">
             <a:extLst>
               <a:ext uri="{FF2B5EF4-FFF2-40B4-BE49-F238E27FC236}">
-                <a16:creationId xmlns:a16="http://schemas.microsoft.com/office/drawing/2014/main" id="{9CBE8611-D923-452D-A3A1-3B9294584E4C}"/>
+                <a16:creationId xmlns:a16="http://schemas.microsoft.com/office/drawing/2014/main" id="{8F9B19EB-AE66-4095-9B45-4E189A272D7C}"/>
               </a:ext>
             </a:extLst>
           </p:cNvPr>
@@ -6888,27 +8293,35 @@
             <p:ph type="title"/>
           </p:nvPr>
         </p:nvSpPr>
-        <p:spPr/>
-        <p:txBody>
-          <a:bodyPr/>
+        <p:spPr>
+          <a:xfrm>
+            <a:off x="838200" y="585216"/>
+            <a:ext cx="10515600" cy="1325563"/>
+          </a:xfrm>
+        </p:spPr>
+        <p:txBody>
+          <a:bodyPr vert="horz" lIns="91440" tIns="45720" rIns="91440" bIns="45720" rtlCol="0" anchor="ctr">
+            <a:normAutofit/>
+          </a:bodyPr>
           <a:lstStyle/>
           <a:p>
             <a:r>
               <a:rPr lang="en-US">
-                <a:cs typeface="Calibri Light"/>
+                <a:solidFill>
+                  <a:schemeClr val="bg1"/>
+                </a:solidFill>
               </a:rPr>
-              <a:t>History Class v1</a:t>
+              <a:t>Help_GUI V1</a:t>
             </a:r>
-            <a:endParaRPr lang="en-US"/>
           </a:p>
         </p:txBody>
       </p:sp>
       <p:pic>
         <p:nvPicPr>
-          <p:cNvPr id="4" name="Picture 4" descr="Text&#10;&#10;Description automatically generated">
+          <p:cNvPr id="4" name="Picture 4" descr="Graphical user interface, text, application&#10;&#10;Description automatically generated">
             <a:extLst>
               <a:ext uri="{FF2B5EF4-FFF2-40B4-BE49-F238E27FC236}">
-                <a16:creationId xmlns:a16="http://schemas.microsoft.com/office/drawing/2014/main" id="{9BBC0BB1-05B1-4C7A-BAA6-9D1A3EC4405E}"/>
+                <a16:creationId xmlns:a16="http://schemas.microsoft.com/office/drawing/2014/main" id="{8438ADBC-F5AF-4A8A-85E8-EE67AC40482F}"/>
               </a:ext>
             </a:extLst>
           </p:cNvPr>
@@ -6919,17 +8332,19 @@
             <p:ph idx="1"/>
           </p:nvPr>
         </p:nvPicPr>
-        <p:blipFill>
+        <p:blipFill rotWithShape="1">
           <a:blip r:embed="rId2"/>
-          <a:stretch>
-            <a:fillRect/>
-          </a:stretch>
+          <a:srcRect t="2134" r="3" b="4017"/>
+          <a:stretch/>
         </p:blipFill>
         <p:spPr>
           <a:xfrm>
-            <a:off x="841036" y="1709461"/>
-            <a:ext cx="2924175" cy="1724025"/>
+            <a:off x="841248" y="2516777"/>
+            <a:ext cx="6236208" cy="3660185"/>
           </a:xfrm>
+          <a:prstGeom prst="rect">
+            <a:avLst/>
+          </a:prstGeom>
         </p:spPr>
       </p:pic>
       <p:sp>
@@ -6937,7 +8352,7 @@
           <p:cNvPr id="5" name="TextBox 4">
             <a:extLst>
               <a:ext uri="{FF2B5EF4-FFF2-40B4-BE49-F238E27FC236}">
-                <a16:creationId xmlns:a16="http://schemas.microsoft.com/office/drawing/2014/main" id="{7289C07D-6306-43CA-BD99-6E1012B6AADC}"/>
+                <a16:creationId xmlns:a16="http://schemas.microsoft.com/office/drawing/2014/main" id="{2451DC0A-CE8C-4807-BE9D-490B61D1DB52}"/>
               </a:ext>
             </a:extLst>
           </p:cNvPr>
@@ -6946,41 +8361,43 @@
         </p:nvSpPr>
         <p:spPr>
           <a:xfrm>
-            <a:off x="6062785" y="1695938"/>
-            <a:ext cx="3690814" cy="1200329"/>
+            <a:off x="7546848" y="2516777"/>
+            <a:ext cx="3803904" cy="3660185"/>
           </a:xfrm>
           <a:prstGeom prst="rect">
             <a:avLst/>
           </a:prstGeom>
-          <a:noFill/>
         </p:spPr>
         <p:txBody>
-          <a:bodyPr rot="0" spcFirstLastPara="0" vertOverflow="overflow" horzOverflow="overflow" vert="horz" wrap="square" lIns="91440" tIns="45720" rIns="91440" bIns="45720" numCol="1" spcCol="0" rtlCol="0" fromWordArt="0" anchor="t" anchorCtr="0" forceAA="0" compatLnSpc="1">
+          <a:bodyPr rot="0" spcFirstLastPara="0" vertOverflow="overflow" horzOverflow="overflow" vert="horz" lIns="91440" tIns="45720" rIns="91440" bIns="45720" numCol="1" spcCol="0" rtlCol="0" fromWordArt="0" anchor="ctr" anchorCtr="0" forceAA="0" compatLnSpc="1">
             <a:prstTxWarp prst="textNoShape">
               <a:avLst/>
             </a:prstTxWarp>
-            <a:spAutoFit/>
+            <a:normAutofit/>
           </a:bodyPr>
           <a:lstStyle/>
           <a:p>
+            <a:pPr indent="-228600">
+              <a:lnSpc>
+                <a:spcPct val="90000"/>
+              </a:lnSpc>
+              <a:spcAft>
+                <a:spcPts val="600"/>
+              </a:spcAft>
+              <a:buFont typeface="Arial" panose="020B0604020202020204" pitchFamily="34" charset="0"/>
+              <a:buChar char="•"/>
+            </a:pPr>
             <a:r>
-              <a:rPr lang="en-US" dirty="0"/>
-              <a:t>First verison of </a:t>
+              <a:rPr lang="en-US" sz="2200"/>
+              <a:t>First version of my help class. It is working and doing what it needs to. I can now shift my attention to my history and export classes.</a:t>
             </a:r>
-            <a:r>
-              <a:rPr lang="en-US"/>
-              <a:t>my History class will leave it for now as I need to finish the assesment asap and now I can focus on my stats and export classes</a:t>
-            </a:r>
-            <a:endParaRPr lang="en-US" dirty="0">
-              <a:cs typeface="Calibri"/>
-            </a:endParaRPr>
           </a:p>
         </p:txBody>
       </p:sp>
     </p:spTree>
     <p:extLst>
       <p:ext uri="{BB962C8B-B14F-4D97-AF65-F5344CB8AC3E}">
-        <p14:creationId xmlns:p14="http://schemas.microsoft.com/office/powerpoint/2010/main" val="1323580387"/>
+        <p14:creationId xmlns:p14="http://schemas.microsoft.com/office/powerpoint/2010/main" val="1147695793"/>
       </p:ext>
     </p:extLst>
   </p:cSld>
@@ -6990,9 +8407,17 @@
 </p:sld>
 </file>
 
-<file path=ppt/slides/slide18.xml><?xml version="1.0" encoding="utf-8"?>
+<file path=ppt/slides/slide19.xml><?xml version="1.0" encoding="utf-8"?>
 <p:sld xmlns:a="http://schemas.openxmlformats.org/drawingml/2006/main" xmlns:r="http://schemas.openxmlformats.org/officeDocument/2006/relationships" xmlns:p="http://schemas.openxmlformats.org/presentationml/2006/main">
   <p:cSld>
+    <p:bg>
+      <p:bgPr>
+        <a:solidFill>
+          <a:schemeClr val="bg1"/>
+        </a:solidFill>
+        <a:effectLst/>
+      </p:bgPr>
+    </p:bg>
     <p:spTree>
       <p:nvGrpSpPr>
         <p:cNvPr id="1" name=""/>
@@ -7012,7 +8437,7 @@
           <p:cNvPr id="2" name="Title 1">
             <a:extLst>
               <a:ext uri="{FF2B5EF4-FFF2-40B4-BE49-F238E27FC236}">
-                <a16:creationId xmlns:a16="http://schemas.microsoft.com/office/drawing/2014/main" id="{84D0D12E-199B-43E5-985E-D1696BFD8418}"/>
+                <a16:creationId xmlns:a16="http://schemas.microsoft.com/office/drawing/2014/main" id="{3338A35F-DABA-455B-8609-6074B938D782}"/>
               </a:ext>
             </a:extLst>
           </p:cNvPr>
@@ -7023,27 +8448,141 @@
             <p:ph type="title"/>
           </p:nvPr>
         </p:nvSpPr>
-        <p:spPr/>
-        <p:txBody>
-          <a:bodyPr/>
+        <p:spPr>
+          <a:xfrm>
+            <a:off x="648929" y="629266"/>
+            <a:ext cx="3667039" cy="1676603"/>
+          </a:xfrm>
+        </p:spPr>
+        <p:txBody>
+          <a:bodyPr vert="horz" lIns="91440" tIns="45720" rIns="91440" bIns="45720" rtlCol="0" anchor="ctr">
+            <a:normAutofit/>
+          </a:bodyPr>
           <a:lstStyle/>
           <a:p>
             <a:r>
-              <a:rPr lang="en-US">
-                <a:cs typeface="Calibri Light"/>
-              </a:rPr>
-              <a:t>Export Class</a:t>
+              <a:rPr lang="en-US" sz="3600"/>
+              <a:t>Help GUI_V2</a:t>
             </a:r>
+          </a:p>
+        </p:txBody>
+      </p:sp>
+      <p:sp>
+        <p:nvSpPr>
+          <p:cNvPr id="5" name="TextBox 4">
+            <a:extLst>
+              <a:ext uri="{FF2B5EF4-FFF2-40B4-BE49-F238E27FC236}">
+                <a16:creationId xmlns:a16="http://schemas.microsoft.com/office/drawing/2014/main" id="{CBF23F37-2278-4E92-B09D-D23C6A43DF06}"/>
+              </a:ext>
+            </a:extLst>
+          </p:cNvPr>
+          <p:cNvSpPr txBox="1"/>
+          <p:nvPr/>
+        </p:nvSpPr>
+        <p:spPr>
+          <a:xfrm>
+            <a:off x="648931" y="2438401"/>
+            <a:ext cx="3667036" cy="3779520"/>
+          </a:xfrm>
+          <a:prstGeom prst="rect">
+            <a:avLst/>
+          </a:prstGeom>
+        </p:spPr>
+        <p:txBody>
+          <a:bodyPr rot="0" spcFirstLastPara="0" vertOverflow="overflow" horzOverflow="overflow" vert="horz" lIns="91440" tIns="45720" rIns="91440" bIns="45720" numCol="1" spcCol="0" rtlCol="0" fromWordArt="0" anchorCtr="0" forceAA="0" compatLnSpc="1">
+            <a:prstTxWarp prst="textNoShape">
+              <a:avLst/>
+            </a:prstTxWarp>
+            <a:normAutofit/>
+          </a:bodyPr>
+          <a:lstStyle/>
+          <a:p>
+            <a:pPr indent="-228600">
+              <a:lnSpc>
+                <a:spcPct val="90000"/>
+              </a:lnSpc>
+              <a:spcAft>
+                <a:spcPts val="600"/>
+              </a:spcAft>
+              <a:buFont typeface="Arial" panose="020B0604020202020204" pitchFamily="34" charset="0"/>
+              <a:buChar char="•"/>
+            </a:pPr>
+            <a:r>
+              <a:rPr lang="en-US"/>
+              <a:t>Updated my help GUI to make it clearer to those that read it and do need help when they do the quiz. Will need to make it even better which you will see in my next Help Gui </a:t>
+            </a:r>
+          </a:p>
+        </p:txBody>
+      </p:sp>
+      <p:sp>
+        <p:nvSpPr>
+          <p:cNvPr id="7" name="Rectangle 9">
+            <a:extLst>
+              <a:ext uri="{FF2B5EF4-FFF2-40B4-BE49-F238E27FC236}">
+                <a16:creationId xmlns:a16="http://schemas.microsoft.com/office/drawing/2014/main" id="{F2B38F72-8FC4-4001-8C67-FA6B86DEC767}"/>
+              </a:ext>
+              <a:ext uri="{C183D7F6-B498-43B3-948B-1728B52AA6E4}">
+                <adec:decorative xmlns:adec="http://schemas.microsoft.com/office/drawing/2017/decorative" val="1"/>
+              </a:ext>
+            </a:extLst>
+          </p:cNvPr>
+          <p:cNvSpPr>
+            <a:spLocks noGrp="1" noRot="1" noChangeAspect="1" noMove="1" noResize="1" noEditPoints="1" noAdjustHandles="1" noChangeArrowheads="1" noChangeShapeType="1" noTextEdit="1"/>
+          </p:cNvSpPr>
+          <p:nvPr>
+            <p:extLst>
+              <p:ext uri="{386F3935-93C4-4BCD-93E2-E3B085C9AB24}">
+                <p16:designElem xmlns:p16="http://schemas.microsoft.com/office/powerpoint/2015/main" val="1"/>
+              </p:ext>
+            </p:extLst>
+          </p:nvPr>
+        </p:nvSpPr>
+        <p:spPr>
+          <a:xfrm>
+            <a:off x="4636008" y="2"/>
+            <a:ext cx="7555992" cy="6857998"/>
+          </a:xfrm>
+          <a:prstGeom prst="rect">
+            <a:avLst/>
+          </a:prstGeom>
+          <a:solidFill>
+            <a:schemeClr val="tx1"/>
+          </a:solidFill>
+          <a:ln>
+            <a:noFill/>
+          </a:ln>
+        </p:spPr>
+        <p:style>
+          <a:lnRef idx="2">
+            <a:schemeClr val="accent1">
+              <a:shade val="50000"/>
+            </a:schemeClr>
+          </a:lnRef>
+          <a:fillRef idx="1">
+            <a:schemeClr val="accent1"/>
+          </a:fillRef>
+          <a:effectRef idx="0">
+            <a:schemeClr val="accent1"/>
+          </a:effectRef>
+          <a:fontRef idx="minor">
+            <a:schemeClr val="lt1"/>
+          </a:fontRef>
+        </p:style>
+        <p:txBody>
+          <a:bodyPr rtlCol="0" anchor="ctr"/>
+          <a:lstStyle/>
+          <a:p>
+            <a:pPr algn="ctr"/>
             <a:endParaRPr lang="en-US"/>
           </a:p>
         </p:txBody>
       </p:sp>
       <p:pic>
         <p:nvPicPr>
-          <p:cNvPr id="4" name="Picture 4" descr="Graphical user interface, text&#10;&#10;Description automatically generated">
+          <p:cNvPr id="4" name="Picture 4" descr="Graphical user interface, text, application&#10;&#10;Description automatically generated">
             <a:extLst>
               <a:ext uri="{FF2B5EF4-FFF2-40B4-BE49-F238E27FC236}">
-                <a16:creationId xmlns:a16="http://schemas.microsoft.com/office/drawing/2014/main" id="{B604AD74-1755-4B20-8AD5-BBD46A5255B2}"/>
+                <a16:creationId xmlns:a16="http://schemas.microsoft.com/office/drawing/2014/main" id="{E47BF48B-7588-4313-AA40-790DCA6BB714}"/>
               </a:ext>
             </a:extLst>
           </p:cNvPr>
@@ -7054,77 +8593,31 @@
             <p:ph idx="1"/>
           </p:nvPr>
         </p:nvPicPr>
-        <p:blipFill>
+        <p:blipFill rotWithShape="1">
           <a:blip r:embed="rId2"/>
-          <a:stretch>
-            <a:fillRect/>
-          </a:stretch>
+          <a:srcRect t="2924" b="3312"/>
+          <a:stretch/>
         </p:blipFill>
         <p:spPr>
           <a:xfrm>
-            <a:off x="635610" y="1637994"/>
-            <a:ext cx="2714625" cy="2733675"/>
-          </a:xfrm>
-        </p:spPr>
-      </p:pic>
-      <p:sp>
-        <p:nvSpPr>
-          <p:cNvPr id="5" name="TextBox 4">
-            <a:extLst>
-              <a:ext uri="{FF2B5EF4-FFF2-40B4-BE49-F238E27FC236}">
-                <a16:creationId xmlns:a16="http://schemas.microsoft.com/office/drawing/2014/main" id="{5F27FE93-30F7-4FFA-9B48-9F56B1846238}"/>
-              </a:ext>
-            </a:extLst>
-          </p:cNvPr>
-          <p:cNvSpPr txBox="1"/>
-          <p:nvPr/>
-        </p:nvSpPr>
-        <p:spPr>
-          <a:xfrm>
-            <a:off x="6678246" y="1637323"/>
-            <a:ext cx="4247660" cy="1200329"/>
+            <a:off x="5276088" y="640082"/>
+            <a:ext cx="6276250" cy="5577838"/>
           </a:xfrm>
           <a:prstGeom prst="rect">
             <a:avLst/>
           </a:prstGeom>
-          <a:noFill/>
+          <a:effectLst/>
         </p:spPr>
-        <p:txBody>
-          <a:bodyPr rot="0" spcFirstLastPara="0" vertOverflow="overflow" horzOverflow="overflow" vert="horz" wrap="square" lIns="91440" tIns="45720" rIns="91440" bIns="45720" numCol="1" spcCol="0" rtlCol="0" fromWordArt="0" anchor="t" anchorCtr="0" forceAA="0" compatLnSpc="1">
-            <a:prstTxWarp prst="textNoShape">
-              <a:avLst/>
-            </a:prstTxWarp>
-            <a:spAutoFit/>
-          </a:bodyPr>
-          <a:lstStyle/>
-          <a:p>
-            <a:r>
-              <a:rPr lang="en-US" dirty="0">
-                <a:cs typeface="Calibri"/>
-              </a:rPr>
-              <a:t>This Export class is from mystery box, and it works exactly how it should. This will be my </a:t>
-            </a:r>
-            <a:r>
-              <a:rPr lang="en-US">
-                <a:cs typeface="Calibri"/>
-              </a:rPr>
-              <a:t>first and final version of my export class. I will come back to it if I need to.</a:t>
-            </a:r>
-            <a:endParaRPr lang="en-US" dirty="0">
-              <a:cs typeface="Calibri"/>
-            </a:endParaRPr>
-          </a:p>
-        </p:txBody>
-      </p:sp>
+      </p:pic>
     </p:spTree>
     <p:extLst>
       <p:ext uri="{BB962C8B-B14F-4D97-AF65-F5344CB8AC3E}">
-        <p14:creationId xmlns:p14="http://schemas.microsoft.com/office/powerpoint/2010/main" val="2698637891"/>
+        <p14:creationId xmlns:p14="http://schemas.microsoft.com/office/powerpoint/2010/main" val="4073712171"/>
       </p:ext>
     </p:extLst>
   </p:cSld>
   <p:clrMapOvr>
-    <a:masterClrMapping/>
+    <a:overrideClrMapping bg1="dk1" tx1="lt1" bg2="dk2" tx2="lt2" accent1="accent1" accent2="accent2" accent3="accent3" accent4="accent4" accent5="accent5" accent6="accent6" hlink="hlink" folHlink="folHlink"/>
   </p:clrMapOvr>
 </p:sld>
 </file>
@@ -7249,6 +8742,474 @@
     <p:extLst>
       <p:ext uri="{BB962C8B-B14F-4D97-AF65-F5344CB8AC3E}">
         <p14:creationId xmlns:p14="http://schemas.microsoft.com/office/powerpoint/2010/main" val="358461426"/>
+      </p:ext>
+    </p:extLst>
+  </p:cSld>
+  <p:clrMapOvr>
+    <a:masterClrMapping/>
+  </p:clrMapOvr>
+</p:sld>
+</file>
+
+<file path=ppt/slides/slide20.xml><?xml version="1.0" encoding="utf-8"?>
+<p:sld xmlns:a="http://schemas.openxmlformats.org/drawingml/2006/main" xmlns:r="http://schemas.openxmlformats.org/officeDocument/2006/relationships" xmlns:p="http://schemas.openxmlformats.org/presentationml/2006/main">
+  <p:cSld>
+    <p:spTree>
+      <p:nvGrpSpPr>
+        <p:cNvPr id="1" name=""/>
+        <p:cNvGrpSpPr/>
+        <p:nvPr/>
+      </p:nvGrpSpPr>
+      <p:grpSpPr>
+        <a:xfrm>
+          <a:off x="0" y="0"/>
+          <a:ext cx="0" cy="0"/>
+          <a:chOff x="0" y="0"/>
+          <a:chExt cx="0" cy="0"/>
+        </a:xfrm>
+      </p:grpSpPr>
+      <p:sp>
+        <p:nvSpPr>
+          <p:cNvPr id="2" name="Title 1">
+            <a:extLst>
+              <a:ext uri="{FF2B5EF4-FFF2-40B4-BE49-F238E27FC236}">
+                <a16:creationId xmlns:a16="http://schemas.microsoft.com/office/drawing/2014/main" id="{EBD7D066-8CE0-4FF3-8DC5-ECEB4DD8FB3E}"/>
+              </a:ext>
+            </a:extLst>
+          </p:cNvPr>
+          <p:cNvSpPr>
+            <a:spLocks noGrp="1"/>
+          </p:cNvSpPr>
+          <p:nvPr>
+            <p:ph type="title"/>
+          </p:nvPr>
+        </p:nvSpPr>
+        <p:spPr/>
+        <p:txBody>
+          <a:bodyPr/>
+          <a:lstStyle/>
+          <a:p>
+            <a:endParaRPr lang="en-US"/>
+          </a:p>
+        </p:txBody>
+      </p:sp>
+      <p:pic>
+        <p:nvPicPr>
+          <p:cNvPr id="4" name="Picture 4" descr="Text, timeline&#10;&#10;Description automatically generated">
+            <a:extLst>
+              <a:ext uri="{FF2B5EF4-FFF2-40B4-BE49-F238E27FC236}">
+                <a16:creationId xmlns:a16="http://schemas.microsoft.com/office/drawing/2014/main" id="{4FB97E77-E247-4A24-B0FF-F97706586B45}"/>
+              </a:ext>
+            </a:extLst>
+          </p:cNvPr>
+          <p:cNvPicPr>
+            <a:picLocks noGrp="1" noChangeAspect="1"/>
+          </p:cNvPicPr>
+          <p:nvPr>
+            <p:ph idx="1"/>
+          </p:nvPr>
+        </p:nvPicPr>
+        <p:blipFill>
+          <a:blip r:embed="rId2"/>
+          <a:stretch>
+            <a:fillRect/>
+          </a:stretch>
+        </p:blipFill>
+        <p:spPr>
+          <a:xfrm>
+            <a:off x="684871" y="1794630"/>
+            <a:ext cx="1947747" cy="2248133"/>
+          </a:xfrm>
+        </p:spPr>
+      </p:pic>
+      <p:sp>
+        <p:nvSpPr>
+          <p:cNvPr id="5" name="TextBox 4">
+            <a:extLst>
+              <a:ext uri="{FF2B5EF4-FFF2-40B4-BE49-F238E27FC236}">
+                <a16:creationId xmlns:a16="http://schemas.microsoft.com/office/drawing/2014/main" id="{FB094B74-0B5A-45CD-B694-352345F0BA54}"/>
+              </a:ext>
+            </a:extLst>
+          </p:cNvPr>
+          <p:cNvSpPr txBox="1"/>
+          <p:nvPr/>
+        </p:nvSpPr>
+        <p:spPr>
+          <a:xfrm>
+            <a:off x="245327" y="4046035"/>
+            <a:ext cx="2436542" cy="1569660"/>
+          </a:xfrm>
+          <a:prstGeom prst="rect">
+            <a:avLst/>
+          </a:prstGeom>
+          <a:noFill/>
+        </p:spPr>
+        <p:txBody>
+          <a:bodyPr rot="0" spcFirstLastPara="0" vertOverflow="overflow" horzOverflow="overflow" vert="horz" wrap="square" lIns="91440" tIns="45720" rIns="91440" bIns="45720" numCol="1" spcCol="0" rtlCol="0" fromWordArt="0" anchor="t" anchorCtr="0" forceAA="0" compatLnSpc="1">
+            <a:prstTxWarp prst="textNoShape">
+              <a:avLst/>
+            </a:prstTxWarp>
+            <a:spAutoFit/>
+          </a:bodyPr>
+          <a:lstStyle/>
+          <a:p>
+            <a:r>
+              <a:rPr lang="en-US" sz="1200" dirty="0">
+                <a:cs typeface="Calibri"/>
+              </a:rPr>
+              <a:t>Have updated my help class so that the instructions / help are clear so that it is easier to find what you are looking for. One difference in the code was to hold the help text in a different string in the label. This made it easier to direct your self to where you are.</a:t>
+            </a:r>
+          </a:p>
+        </p:txBody>
+      </p:sp>
+      <p:pic>
+        <p:nvPicPr>
+          <p:cNvPr id="6" name="Picture 6" descr="Text, timeline&#10;&#10;Description automatically generated">
+            <a:extLst>
+              <a:ext uri="{FF2B5EF4-FFF2-40B4-BE49-F238E27FC236}">
+                <a16:creationId xmlns:a16="http://schemas.microsoft.com/office/drawing/2014/main" id="{05759C2A-6B97-41F9-8679-DBBB986216A1}"/>
+              </a:ext>
+            </a:extLst>
+          </p:cNvPr>
+          <p:cNvPicPr>
+            <a:picLocks noChangeAspect="1"/>
+          </p:cNvPicPr>
+          <p:nvPr/>
+        </p:nvPicPr>
+        <p:blipFill>
+          <a:blip r:embed="rId3"/>
+          <a:stretch>
+            <a:fillRect/>
+          </a:stretch>
+        </p:blipFill>
+        <p:spPr>
+          <a:xfrm>
+            <a:off x="2958790" y="1753114"/>
+            <a:ext cx="1934737" cy="2255236"/>
+          </a:xfrm>
+          <a:prstGeom prst="rect">
+            <a:avLst/>
+          </a:prstGeom>
+        </p:spPr>
+      </p:pic>
+      <p:sp>
+        <p:nvSpPr>
+          <p:cNvPr id="7" name="TextBox 6">
+            <a:extLst>
+              <a:ext uri="{FF2B5EF4-FFF2-40B4-BE49-F238E27FC236}">
+                <a16:creationId xmlns:a16="http://schemas.microsoft.com/office/drawing/2014/main" id="{E503F48E-5D6B-4297-B4BA-E1202BFA09DD}"/>
+              </a:ext>
+            </a:extLst>
+          </p:cNvPr>
+          <p:cNvSpPr txBox="1"/>
+          <p:nvPr/>
+        </p:nvSpPr>
+        <p:spPr>
+          <a:xfrm>
+            <a:off x="2930912" y="4046034"/>
+            <a:ext cx="1962615" cy="461665"/>
+          </a:xfrm>
+          <a:prstGeom prst="rect">
+            <a:avLst/>
+          </a:prstGeom>
+          <a:noFill/>
+        </p:spPr>
+        <p:txBody>
+          <a:bodyPr rot="0" spcFirstLastPara="0" vertOverflow="overflow" horzOverflow="overflow" vert="horz" wrap="square" lIns="91440" tIns="45720" rIns="91440" bIns="45720" numCol="1" spcCol="0" rtlCol="0" fromWordArt="0" anchor="t" anchorCtr="0" forceAA="0" compatLnSpc="1">
+            <a:prstTxWarp prst="textNoShape">
+              <a:avLst/>
+            </a:prstTxWarp>
+            <a:spAutoFit/>
+          </a:bodyPr>
+          <a:lstStyle/>
+          <a:p>
+            <a:r>
+              <a:rPr lang="en-US" sz="1200" dirty="0">
+                <a:cs typeface="Calibri"/>
+              </a:rPr>
+              <a:t>Have fixed a error I made in the text</a:t>
+            </a:r>
+          </a:p>
+        </p:txBody>
+      </p:sp>
+    </p:spTree>
+    <p:extLst>
+      <p:ext uri="{BB962C8B-B14F-4D97-AF65-F5344CB8AC3E}">
+        <p14:creationId xmlns:p14="http://schemas.microsoft.com/office/powerpoint/2010/main" val="446857315"/>
+      </p:ext>
+    </p:extLst>
+  </p:cSld>
+  <p:clrMapOvr>
+    <a:masterClrMapping/>
+  </p:clrMapOvr>
+</p:sld>
+</file>
+
+<file path=ppt/slides/slide21.xml><?xml version="1.0" encoding="utf-8"?>
+<p:sld xmlns:a="http://schemas.openxmlformats.org/drawingml/2006/main" xmlns:r="http://schemas.openxmlformats.org/officeDocument/2006/relationships" xmlns:p="http://schemas.openxmlformats.org/presentationml/2006/main">
+  <p:cSld>
+    <p:spTree>
+      <p:nvGrpSpPr>
+        <p:cNvPr id="1" name=""/>
+        <p:cNvGrpSpPr/>
+        <p:nvPr/>
+      </p:nvGrpSpPr>
+      <p:grpSpPr>
+        <a:xfrm>
+          <a:off x="0" y="0"/>
+          <a:ext cx="0" cy="0"/>
+          <a:chOff x="0" y="0"/>
+          <a:chExt cx="0" cy="0"/>
+        </a:xfrm>
+      </p:grpSpPr>
+      <p:sp>
+        <p:nvSpPr>
+          <p:cNvPr id="2" name="Title 1">
+            <a:extLst>
+              <a:ext uri="{FF2B5EF4-FFF2-40B4-BE49-F238E27FC236}">
+                <a16:creationId xmlns:a16="http://schemas.microsoft.com/office/drawing/2014/main" id="{9CBE8611-D923-452D-A3A1-3B9294584E4C}"/>
+              </a:ext>
+            </a:extLst>
+          </p:cNvPr>
+          <p:cNvSpPr>
+            <a:spLocks noGrp="1"/>
+          </p:cNvSpPr>
+          <p:nvPr>
+            <p:ph type="title"/>
+          </p:nvPr>
+        </p:nvSpPr>
+        <p:spPr/>
+        <p:txBody>
+          <a:bodyPr/>
+          <a:lstStyle/>
+          <a:p>
+            <a:r>
+              <a:rPr lang="en-US">
+                <a:cs typeface="Calibri Light"/>
+              </a:rPr>
+              <a:t>History Class v1</a:t>
+            </a:r>
+            <a:endParaRPr lang="en-US"/>
+          </a:p>
+        </p:txBody>
+      </p:sp>
+      <p:pic>
+        <p:nvPicPr>
+          <p:cNvPr id="4" name="Picture 4" descr="Text&#10;&#10;Description automatically generated">
+            <a:extLst>
+              <a:ext uri="{FF2B5EF4-FFF2-40B4-BE49-F238E27FC236}">
+                <a16:creationId xmlns:a16="http://schemas.microsoft.com/office/drawing/2014/main" id="{9BBC0BB1-05B1-4C7A-BAA6-9D1A3EC4405E}"/>
+              </a:ext>
+            </a:extLst>
+          </p:cNvPr>
+          <p:cNvPicPr>
+            <a:picLocks noGrp="1" noChangeAspect="1"/>
+          </p:cNvPicPr>
+          <p:nvPr>
+            <p:ph idx="1"/>
+          </p:nvPr>
+        </p:nvPicPr>
+        <p:blipFill>
+          <a:blip r:embed="rId2"/>
+          <a:stretch>
+            <a:fillRect/>
+          </a:stretch>
+        </p:blipFill>
+        <p:spPr>
+          <a:xfrm>
+            <a:off x="841036" y="1709461"/>
+            <a:ext cx="2924175" cy="1724025"/>
+          </a:xfrm>
+        </p:spPr>
+      </p:pic>
+      <p:sp>
+        <p:nvSpPr>
+          <p:cNvPr id="5" name="TextBox 4">
+            <a:extLst>
+              <a:ext uri="{FF2B5EF4-FFF2-40B4-BE49-F238E27FC236}">
+                <a16:creationId xmlns:a16="http://schemas.microsoft.com/office/drawing/2014/main" id="{7289C07D-6306-43CA-BD99-6E1012B6AADC}"/>
+              </a:ext>
+            </a:extLst>
+          </p:cNvPr>
+          <p:cNvSpPr txBox="1"/>
+          <p:nvPr/>
+        </p:nvSpPr>
+        <p:spPr>
+          <a:xfrm>
+            <a:off x="6062785" y="1695938"/>
+            <a:ext cx="3690814" cy="1200329"/>
+          </a:xfrm>
+          <a:prstGeom prst="rect">
+            <a:avLst/>
+          </a:prstGeom>
+          <a:noFill/>
+        </p:spPr>
+        <p:txBody>
+          <a:bodyPr rot="0" spcFirstLastPara="0" vertOverflow="overflow" horzOverflow="overflow" vert="horz" wrap="square" lIns="91440" tIns="45720" rIns="91440" bIns="45720" numCol="1" spcCol="0" rtlCol="0" fromWordArt="0" anchor="t" anchorCtr="0" forceAA="0" compatLnSpc="1">
+            <a:prstTxWarp prst="textNoShape">
+              <a:avLst/>
+            </a:prstTxWarp>
+            <a:spAutoFit/>
+          </a:bodyPr>
+          <a:lstStyle/>
+          <a:p>
+            <a:r>
+              <a:rPr lang="en-US" dirty="0"/>
+              <a:t>First verison of </a:t>
+            </a:r>
+            <a:r>
+              <a:rPr lang="en-US"/>
+              <a:t>my History class will leave it for now as I need to finish the assesment asap and now I can focus on my stats and export classes</a:t>
+            </a:r>
+            <a:endParaRPr lang="en-US" dirty="0">
+              <a:cs typeface="Calibri"/>
+            </a:endParaRPr>
+          </a:p>
+        </p:txBody>
+      </p:sp>
+    </p:spTree>
+    <p:extLst>
+      <p:ext uri="{BB962C8B-B14F-4D97-AF65-F5344CB8AC3E}">
+        <p14:creationId xmlns:p14="http://schemas.microsoft.com/office/powerpoint/2010/main" val="1323580387"/>
+      </p:ext>
+    </p:extLst>
+  </p:cSld>
+  <p:clrMapOvr>
+    <a:masterClrMapping/>
+  </p:clrMapOvr>
+</p:sld>
+</file>
+
+<file path=ppt/slides/slide22.xml><?xml version="1.0" encoding="utf-8"?>
+<p:sld xmlns:a="http://schemas.openxmlformats.org/drawingml/2006/main" xmlns:r="http://schemas.openxmlformats.org/officeDocument/2006/relationships" xmlns:p="http://schemas.openxmlformats.org/presentationml/2006/main">
+  <p:cSld>
+    <p:spTree>
+      <p:nvGrpSpPr>
+        <p:cNvPr id="1" name=""/>
+        <p:cNvGrpSpPr/>
+        <p:nvPr/>
+      </p:nvGrpSpPr>
+      <p:grpSpPr>
+        <a:xfrm>
+          <a:off x="0" y="0"/>
+          <a:ext cx="0" cy="0"/>
+          <a:chOff x="0" y="0"/>
+          <a:chExt cx="0" cy="0"/>
+        </a:xfrm>
+      </p:grpSpPr>
+      <p:sp>
+        <p:nvSpPr>
+          <p:cNvPr id="2" name="Title 1">
+            <a:extLst>
+              <a:ext uri="{FF2B5EF4-FFF2-40B4-BE49-F238E27FC236}">
+                <a16:creationId xmlns:a16="http://schemas.microsoft.com/office/drawing/2014/main" id="{84D0D12E-199B-43E5-985E-D1696BFD8418}"/>
+              </a:ext>
+            </a:extLst>
+          </p:cNvPr>
+          <p:cNvSpPr>
+            <a:spLocks noGrp="1"/>
+          </p:cNvSpPr>
+          <p:nvPr>
+            <p:ph type="title"/>
+          </p:nvPr>
+        </p:nvSpPr>
+        <p:spPr/>
+        <p:txBody>
+          <a:bodyPr/>
+          <a:lstStyle/>
+          <a:p>
+            <a:r>
+              <a:rPr lang="en-US">
+                <a:cs typeface="Calibri Light"/>
+              </a:rPr>
+              <a:t>Export Class</a:t>
+            </a:r>
+            <a:endParaRPr lang="en-US"/>
+          </a:p>
+        </p:txBody>
+      </p:sp>
+      <p:pic>
+        <p:nvPicPr>
+          <p:cNvPr id="4" name="Picture 4" descr="Graphical user interface, text&#10;&#10;Description automatically generated">
+            <a:extLst>
+              <a:ext uri="{FF2B5EF4-FFF2-40B4-BE49-F238E27FC236}">
+                <a16:creationId xmlns:a16="http://schemas.microsoft.com/office/drawing/2014/main" id="{B604AD74-1755-4B20-8AD5-BBD46A5255B2}"/>
+              </a:ext>
+            </a:extLst>
+          </p:cNvPr>
+          <p:cNvPicPr>
+            <a:picLocks noGrp="1" noChangeAspect="1"/>
+          </p:cNvPicPr>
+          <p:nvPr>
+            <p:ph idx="1"/>
+          </p:nvPr>
+        </p:nvPicPr>
+        <p:blipFill>
+          <a:blip r:embed="rId2"/>
+          <a:stretch>
+            <a:fillRect/>
+          </a:stretch>
+        </p:blipFill>
+        <p:spPr>
+          <a:xfrm>
+            <a:off x="635610" y="1637994"/>
+            <a:ext cx="2714625" cy="2733675"/>
+          </a:xfrm>
+        </p:spPr>
+      </p:pic>
+      <p:sp>
+        <p:nvSpPr>
+          <p:cNvPr id="5" name="TextBox 4">
+            <a:extLst>
+              <a:ext uri="{FF2B5EF4-FFF2-40B4-BE49-F238E27FC236}">
+                <a16:creationId xmlns:a16="http://schemas.microsoft.com/office/drawing/2014/main" id="{5F27FE93-30F7-4FFA-9B48-9F56B1846238}"/>
+              </a:ext>
+            </a:extLst>
+          </p:cNvPr>
+          <p:cNvSpPr txBox="1"/>
+          <p:nvPr/>
+        </p:nvSpPr>
+        <p:spPr>
+          <a:xfrm>
+            <a:off x="6678246" y="1637323"/>
+            <a:ext cx="4247660" cy="1200329"/>
+          </a:xfrm>
+          <a:prstGeom prst="rect">
+            <a:avLst/>
+          </a:prstGeom>
+          <a:noFill/>
+        </p:spPr>
+        <p:txBody>
+          <a:bodyPr rot="0" spcFirstLastPara="0" vertOverflow="overflow" horzOverflow="overflow" vert="horz" wrap="square" lIns="91440" tIns="45720" rIns="91440" bIns="45720" numCol="1" spcCol="0" rtlCol="0" fromWordArt="0" anchor="t" anchorCtr="0" forceAA="0" compatLnSpc="1">
+            <a:prstTxWarp prst="textNoShape">
+              <a:avLst/>
+            </a:prstTxWarp>
+            <a:spAutoFit/>
+          </a:bodyPr>
+          <a:lstStyle/>
+          <a:p>
+            <a:r>
+              <a:rPr lang="en-US" dirty="0">
+                <a:cs typeface="Calibri"/>
+              </a:rPr>
+              <a:t>This Export class is from mystery box, and it works exactly how it should. This will be my </a:t>
+            </a:r>
+            <a:r>
+              <a:rPr lang="en-US">
+                <a:cs typeface="Calibri"/>
+              </a:rPr>
+              <a:t>first and final version of my export class. I will come back to it if I need to.</a:t>
+            </a:r>
+            <a:endParaRPr lang="en-US" dirty="0">
+              <a:cs typeface="Calibri"/>
+            </a:endParaRPr>
+          </a:p>
+        </p:txBody>
+      </p:sp>
+    </p:spTree>
+    <p:extLst>
+      <p:ext uri="{BB962C8B-B14F-4D97-AF65-F5344CB8AC3E}">
+        <p14:creationId xmlns:p14="http://schemas.microsoft.com/office/powerpoint/2010/main" val="2698637891"/>
       </p:ext>
     </p:extLst>
   </p:cSld>

</xml_diff>